<commit_message>
All environments and paths have been created and named with the correct ID
All environments and paths have been created and named with the correct ID and instruction slides were created.
</commit_message>
<xml_diff>
--- a/Assets/StreamingAssets/2D_Objects/Paths/Paths.pptx
+++ b/Assets/StreamingAssets/2D_Objects/Paths/Paths.pptx
@@ -9,6 +9,53 @@
     <p:sldId id="257" r:id="rId3"/>
     <p:sldId id="258" r:id="rId4"/>
     <p:sldId id="259" r:id="rId5"/>
+    <p:sldId id="260" r:id="rId6"/>
+    <p:sldId id="261" r:id="rId7"/>
+    <p:sldId id="262" r:id="rId8"/>
+    <p:sldId id="263" r:id="rId9"/>
+    <p:sldId id="264" r:id="rId10"/>
+    <p:sldId id="265" r:id="rId11"/>
+    <p:sldId id="266" r:id="rId12"/>
+    <p:sldId id="267" r:id="rId13"/>
+    <p:sldId id="268" r:id="rId14"/>
+    <p:sldId id="277" r:id="rId15"/>
+    <p:sldId id="278" r:id="rId16"/>
+    <p:sldId id="279" r:id="rId17"/>
+    <p:sldId id="280" r:id="rId18"/>
+    <p:sldId id="273" r:id="rId19"/>
+    <p:sldId id="274" r:id="rId20"/>
+    <p:sldId id="275" r:id="rId21"/>
+    <p:sldId id="276" r:id="rId22"/>
+    <p:sldId id="269" r:id="rId23"/>
+    <p:sldId id="270" r:id="rId24"/>
+    <p:sldId id="271" r:id="rId25"/>
+    <p:sldId id="272" r:id="rId26"/>
+    <p:sldId id="281" r:id="rId27"/>
+    <p:sldId id="282" r:id="rId28"/>
+    <p:sldId id="283" r:id="rId29"/>
+    <p:sldId id="284" r:id="rId30"/>
+    <p:sldId id="285" r:id="rId31"/>
+    <p:sldId id="286" r:id="rId32"/>
+    <p:sldId id="287" r:id="rId33"/>
+    <p:sldId id="288" r:id="rId34"/>
+    <p:sldId id="289" r:id="rId35"/>
+    <p:sldId id="290" r:id="rId36"/>
+    <p:sldId id="291" r:id="rId37"/>
+    <p:sldId id="292" r:id="rId38"/>
+    <p:sldId id="293" r:id="rId39"/>
+    <p:sldId id="294" r:id="rId40"/>
+    <p:sldId id="295" r:id="rId41"/>
+    <p:sldId id="296" r:id="rId42"/>
+    <p:sldId id="297" r:id="rId43"/>
+    <p:sldId id="298" r:id="rId44"/>
+    <p:sldId id="299" r:id="rId45"/>
+    <p:sldId id="300" r:id="rId46"/>
+    <p:sldId id="301" r:id="rId47"/>
+    <p:sldId id="302" r:id="rId48"/>
+    <p:sldId id="303" r:id="rId49"/>
+    <p:sldId id="304" r:id="rId50"/>
+    <p:sldId id="305" r:id="rId51"/>
+    <p:sldId id="306" r:id="rId52"/>
   </p:sldIdLst>
   <p:sldSz cx="12192000" cy="6858000"/>
   <p:notesSz cx="6858000" cy="9144000"/>
@@ -107,6 +154,11 @@
       </a:defRPr>
     </a:lvl9pPr>
   </p:defaultTextStyle>
+  <p:extLst>
+    <p:ext uri="{EFAFB233-063F-42B5-8137-9DF3F51BA10A}">
+      <p15:sldGuideLst xmlns:p15="http://schemas.microsoft.com/office/powerpoint/2012/main"/>
+    </p:ext>
+  </p:extLst>
 </p:presentation>
 </file>
 
@@ -257,7 +309,7 @@
           <a:p>
             <a:fld id="{C8911E34-5C43-4C10-A98F-E898CD640FFF}" type="datetimeFigureOut">
               <a:rPr lang="en-US" smtClean="0"/>
-              <a:t>7/28/2020</a:t>
+              <a:t>8/7/2020</a:t>
             </a:fld>
             <a:endParaRPr lang="en-US"/>
           </a:p>
@@ -455,7 +507,7 @@
           <a:p>
             <a:fld id="{C8911E34-5C43-4C10-A98F-E898CD640FFF}" type="datetimeFigureOut">
               <a:rPr lang="en-US" smtClean="0"/>
-              <a:t>7/28/2020</a:t>
+              <a:t>8/7/2020</a:t>
             </a:fld>
             <a:endParaRPr lang="en-US"/>
           </a:p>
@@ -663,7 +715,7 @@
           <a:p>
             <a:fld id="{C8911E34-5C43-4C10-A98F-E898CD640FFF}" type="datetimeFigureOut">
               <a:rPr lang="en-US" smtClean="0"/>
-              <a:t>7/28/2020</a:t>
+              <a:t>8/7/2020</a:t>
             </a:fld>
             <a:endParaRPr lang="en-US"/>
           </a:p>
@@ -861,7 +913,7 @@
           <a:p>
             <a:fld id="{C8911E34-5C43-4C10-A98F-E898CD640FFF}" type="datetimeFigureOut">
               <a:rPr lang="en-US" smtClean="0"/>
-              <a:t>7/28/2020</a:t>
+              <a:t>8/7/2020</a:t>
             </a:fld>
             <a:endParaRPr lang="en-US"/>
           </a:p>
@@ -1136,7 +1188,7 @@
           <a:p>
             <a:fld id="{C8911E34-5C43-4C10-A98F-E898CD640FFF}" type="datetimeFigureOut">
               <a:rPr lang="en-US" smtClean="0"/>
-              <a:t>7/28/2020</a:t>
+              <a:t>8/7/2020</a:t>
             </a:fld>
             <a:endParaRPr lang="en-US"/>
           </a:p>
@@ -1401,7 +1453,7 @@
           <a:p>
             <a:fld id="{C8911E34-5C43-4C10-A98F-E898CD640FFF}" type="datetimeFigureOut">
               <a:rPr lang="en-US" smtClean="0"/>
-              <a:t>7/28/2020</a:t>
+              <a:t>8/7/2020</a:t>
             </a:fld>
             <a:endParaRPr lang="en-US"/>
           </a:p>
@@ -1813,7 +1865,7 @@
           <a:p>
             <a:fld id="{C8911E34-5C43-4C10-A98F-E898CD640FFF}" type="datetimeFigureOut">
               <a:rPr lang="en-US" smtClean="0"/>
-              <a:t>7/28/2020</a:t>
+              <a:t>8/7/2020</a:t>
             </a:fld>
             <a:endParaRPr lang="en-US"/>
           </a:p>
@@ -1954,7 +2006,7 @@
           <a:p>
             <a:fld id="{C8911E34-5C43-4C10-A98F-E898CD640FFF}" type="datetimeFigureOut">
               <a:rPr lang="en-US" smtClean="0"/>
-              <a:t>7/28/2020</a:t>
+              <a:t>8/7/2020</a:t>
             </a:fld>
             <a:endParaRPr lang="en-US"/>
           </a:p>
@@ -2067,7 +2119,7 @@
           <a:p>
             <a:fld id="{C8911E34-5C43-4C10-A98F-E898CD640FFF}" type="datetimeFigureOut">
               <a:rPr lang="en-US" smtClean="0"/>
-              <a:t>7/28/2020</a:t>
+              <a:t>8/7/2020</a:t>
             </a:fld>
             <a:endParaRPr lang="en-US"/>
           </a:p>
@@ -2378,7 +2430,7 @@
           <a:p>
             <a:fld id="{C8911E34-5C43-4C10-A98F-E898CD640FFF}" type="datetimeFigureOut">
               <a:rPr lang="en-US" smtClean="0"/>
-              <a:t>7/28/2020</a:t>
+              <a:t>8/7/2020</a:t>
             </a:fld>
             <a:endParaRPr lang="en-US"/>
           </a:p>
@@ -2666,7 +2718,7 @@
           <a:p>
             <a:fld id="{C8911E34-5C43-4C10-A98F-E898CD640FFF}" type="datetimeFigureOut">
               <a:rPr lang="en-US" smtClean="0"/>
-              <a:t>7/28/2020</a:t>
+              <a:t>8/7/2020</a:t>
             </a:fld>
             <a:endParaRPr lang="en-US"/>
           </a:p>
@@ -2907,7 +2959,7 @@
           <a:p>
             <a:fld id="{C8911E34-5C43-4C10-A98F-E898CD640FFF}" type="datetimeFigureOut">
               <a:rPr lang="en-US" smtClean="0"/>
-              <a:t>7/28/2020</a:t>
+              <a:t>8/7/2020</a:t>
             </a:fld>
             <a:endParaRPr lang="en-US"/>
           </a:p>
@@ -3397,6 +3449,904 @@
 </p:sld>
 </file>
 
+<file path=ppt/slides/slide10.xml><?xml version="1.0" encoding="utf-8"?>
+<p:sld xmlns:a="http://schemas.openxmlformats.org/drawingml/2006/main" xmlns:r="http://schemas.openxmlformats.org/officeDocument/2006/relationships" xmlns:p="http://schemas.openxmlformats.org/presentationml/2006/main">
+  <p:cSld>
+    <p:spTree>
+      <p:nvGrpSpPr>
+        <p:cNvPr id="1" name=""/>
+        <p:cNvGrpSpPr/>
+        <p:nvPr/>
+      </p:nvGrpSpPr>
+      <p:grpSpPr>
+        <a:xfrm>
+          <a:off x="0" y="0"/>
+          <a:ext cx="0" cy="0"/>
+          <a:chOff x="0" y="0"/>
+          <a:chExt cx="0" cy="0"/>
+        </a:xfrm>
+      </p:grpSpPr>
+      <p:sp>
+        <p:nvSpPr>
+          <p:cNvPr id="2" name="Title 1">
+            <a:extLst>
+              <a:ext uri="{FF2B5EF4-FFF2-40B4-BE49-F238E27FC236}">
+                <a16:creationId xmlns:a16="http://schemas.microsoft.com/office/drawing/2014/main" id="{0C1E1419-D755-4EE5-A721-4D53D835F5D1}"/>
+              </a:ext>
+            </a:extLst>
+          </p:cNvPr>
+          <p:cNvSpPr>
+            <a:spLocks noGrp="1"/>
+          </p:cNvSpPr>
+          <p:nvPr>
+            <p:ph type="ctrTitle"/>
+          </p:nvPr>
+        </p:nvSpPr>
+        <p:spPr/>
+        <p:txBody>
+          <a:bodyPr/>
+          <a:lstStyle/>
+          <a:p>
+            <a:r>
+              <a:rPr lang="en-US" b="1" dirty="0">
+                <a:latin typeface="+mn-lt"/>
+              </a:rPr>
+              <a:t>PATH 3b</a:t>
+            </a:r>
+          </a:p>
+        </p:txBody>
+      </p:sp>
+      <p:sp>
+        <p:nvSpPr>
+          <p:cNvPr id="3" name="Subtitle 2">
+            <a:extLst>
+              <a:ext uri="{FF2B5EF4-FFF2-40B4-BE49-F238E27FC236}">
+                <a16:creationId xmlns:a16="http://schemas.microsoft.com/office/drawing/2014/main" id="{B0AC6204-0C0A-4559-BC12-21BAB2CE2413}"/>
+              </a:ext>
+            </a:extLst>
+          </p:cNvPr>
+          <p:cNvSpPr>
+            <a:spLocks noGrp="1"/>
+          </p:cNvSpPr>
+          <p:nvPr>
+            <p:ph type="subTitle" idx="1"/>
+          </p:nvPr>
+        </p:nvSpPr>
+        <p:spPr/>
+        <p:txBody>
+          <a:bodyPr>
+            <a:normAutofit/>
+          </a:bodyPr>
+          <a:lstStyle/>
+          <a:p>
+            <a:r>
+              <a:rPr lang="en-US" sz="7200" dirty="0"/>
+              <a:t>1-1-4</a:t>
+            </a:r>
+          </a:p>
+        </p:txBody>
+      </p:sp>
+    </p:spTree>
+    <p:extLst>
+      <p:ext uri="{BB962C8B-B14F-4D97-AF65-F5344CB8AC3E}">
+        <p14:creationId xmlns:p14="http://schemas.microsoft.com/office/powerpoint/2010/main" val="1403559350"/>
+      </p:ext>
+    </p:extLst>
+  </p:cSld>
+  <p:clrMapOvr>
+    <a:masterClrMapping/>
+  </p:clrMapOvr>
+</p:sld>
+</file>
+
+<file path=ppt/slides/slide11.xml><?xml version="1.0" encoding="utf-8"?>
+<p:sld xmlns:a="http://schemas.openxmlformats.org/drawingml/2006/main" xmlns:r="http://schemas.openxmlformats.org/officeDocument/2006/relationships" xmlns:p="http://schemas.openxmlformats.org/presentationml/2006/main">
+  <p:cSld>
+    <p:spTree>
+      <p:nvGrpSpPr>
+        <p:cNvPr id="1" name=""/>
+        <p:cNvGrpSpPr/>
+        <p:nvPr/>
+      </p:nvGrpSpPr>
+      <p:grpSpPr>
+        <a:xfrm>
+          <a:off x="0" y="0"/>
+          <a:ext cx="0" cy="0"/>
+          <a:chOff x="0" y="0"/>
+          <a:chExt cx="0" cy="0"/>
+        </a:xfrm>
+      </p:grpSpPr>
+      <p:sp>
+        <p:nvSpPr>
+          <p:cNvPr id="2" name="Title 1">
+            <a:extLst>
+              <a:ext uri="{FF2B5EF4-FFF2-40B4-BE49-F238E27FC236}">
+                <a16:creationId xmlns:a16="http://schemas.microsoft.com/office/drawing/2014/main" id="{0C1E1419-D755-4EE5-A721-4D53D835F5D1}"/>
+              </a:ext>
+            </a:extLst>
+          </p:cNvPr>
+          <p:cNvSpPr>
+            <a:spLocks noGrp="1"/>
+          </p:cNvSpPr>
+          <p:nvPr>
+            <p:ph type="ctrTitle"/>
+          </p:nvPr>
+        </p:nvSpPr>
+        <p:spPr/>
+        <p:txBody>
+          <a:bodyPr/>
+          <a:lstStyle/>
+          <a:p>
+            <a:r>
+              <a:rPr lang="en-US" b="1" dirty="0">
+                <a:latin typeface="+mn-lt"/>
+              </a:rPr>
+              <a:t>PATH 3c</a:t>
+            </a:r>
+          </a:p>
+        </p:txBody>
+      </p:sp>
+      <p:sp>
+        <p:nvSpPr>
+          <p:cNvPr id="3" name="Subtitle 2">
+            <a:extLst>
+              <a:ext uri="{FF2B5EF4-FFF2-40B4-BE49-F238E27FC236}">
+                <a16:creationId xmlns:a16="http://schemas.microsoft.com/office/drawing/2014/main" id="{B0AC6204-0C0A-4559-BC12-21BAB2CE2413}"/>
+              </a:ext>
+            </a:extLst>
+          </p:cNvPr>
+          <p:cNvSpPr>
+            <a:spLocks noGrp="1"/>
+          </p:cNvSpPr>
+          <p:nvPr>
+            <p:ph type="subTitle" idx="1"/>
+          </p:nvPr>
+        </p:nvSpPr>
+        <p:spPr/>
+        <p:txBody>
+          <a:bodyPr>
+            <a:normAutofit/>
+          </a:bodyPr>
+          <a:lstStyle/>
+          <a:p>
+            <a:r>
+              <a:rPr lang="en-US" sz="7200" dirty="0"/>
+              <a:t>1-1-4</a:t>
+            </a:r>
+          </a:p>
+        </p:txBody>
+      </p:sp>
+    </p:spTree>
+    <p:extLst>
+      <p:ext uri="{BB962C8B-B14F-4D97-AF65-F5344CB8AC3E}">
+        <p14:creationId xmlns:p14="http://schemas.microsoft.com/office/powerpoint/2010/main" val="2339426216"/>
+      </p:ext>
+    </p:extLst>
+  </p:cSld>
+  <p:clrMapOvr>
+    <a:masterClrMapping/>
+  </p:clrMapOvr>
+</p:sld>
+</file>
+
+<file path=ppt/slides/slide12.xml><?xml version="1.0" encoding="utf-8"?>
+<p:sld xmlns:a="http://schemas.openxmlformats.org/drawingml/2006/main" xmlns:r="http://schemas.openxmlformats.org/officeDocument/2006/relationships" xmlns:p="http://schemas.openxmlformats.org/presentationml/2006/main">
+  <p:cSld>
+    <p:spTree>
+      <p:nvGrpSpPr>
+        <p:cNvPr id="1" name=""/>
+        <p:cNvGrpSpPr/>
+        <p:nvPr/>
+      </p:nvGrpSpPr>
+      <p:grpSpPr>
+        <a:xfrm>
+          <a:off x="0" y="0"/>
+          <a:ext cx="0" cy="0"/>
+          <a:chOff x="0" y="0"/>
+          <a:chExt cx="0" cy="0"/>
+        </a:xfrm>
+      </p:grpSpPr>
+      <p:sp>
+        <p:nvSpPr>
+          <p:cNvPr id="2" name="Title 1">
+            <a:extLst>
+              <a:ext uri="{FF2B5EF4-FFF2-40B4-BE49-F238E27FC236}">
+                <a16:creationId xmlns:a16="http://schemas.microsoft.com/office/drawing/2014/main" id="{0C1E1419-D755-4EE5-A721-4D53D835F5D1}"/>
+              </a:ext>
+            </a:extLst>
+          </p:cNvPr>
+          <p:cNvSpPr>
+            <a:spLocks noGrp="1"/>
+          </p:cNvSpPr>
+          <p:nvPr>
+            <p:ph type="ctrTitle"/>
+          </p:nvPr>
+        </p:nvSpPr>
+        <p:spPr/>
+        <p:txBody>
+          <a:bodyPr/>
+          <a:lstStyle/>
+          <a:p>
+            <a:r>
+              <a:rPr lang="en-US" b="1" dirty="0">
+                <a:latin typeface="+mn-lt"/>
+              </a:rPr>
+              <a:t>PATH 3d</a:t>
+            </a:r>
+          </a:p>
+        </p:txBody>
+      </p:sp>
+      <p:sp>
+        <p:nvSpPr>
+          <p:cNvPr id="3" name="Subtitle 2">
+            <a:extLst>
+              <a:ext uri="{FF2B5EF4-FFF2-40B4-BE49-F238E27FC236}">
+                <a16:creationId xmlns:a16="http://schemas.microsoft.com/office/drawing/2014/main" id="{B0AC6204-0C0A-4559-BC12-21BAB2CE2413}"/>
+              </a:ext>
+            </a:extLst>
+          </p:cNvPr>
+          <p:cNvSpPr>
+            <a:spLocks noGrp="1"/>
+          </p:cNvSpPr>
+          <p:nvPr>
+            <p:ph type="subTitle" idx="1"/>
+          </p:nvPr>
+        </p:nvSpPr>
+        <p:spPr/>
+        <p:txBody>
+          <a:bodyPr>
+            <a:normAutofit/>
+          </a:bodyPr>
+          <a:lstStyle/>
+          <a:p>
+            <a:r>
+              <a:rPr lang="en-US" sz="7200" dirty="0"/>
+              <a:t>1-1-4</a:t>
+            </a:r>
+          </a:p>
+        </p:txBody>
+      </p:sp>
+    </p:spTree>
+    <p:extLst>
+      <p:ext uri="{BB962C8B-B14F-4D97-AF65-F5344CB8AC3E}">
+        <p14:creationId xmlns:p14="http://schemas.microsoft.com/office/powerpoint/2010/main" val="2230143652"/>
+      </p:ext>
+    </p:extLst>
+  </p:cSld>
+  <p:clrMapOvr>
+    <a:masterClrMapping/>
+  </p:clrMapOvr>
+</p:sld>
+</file>
+
+<file path=ppt/slides/slide13.xml><?xml version="1.0" encoding="utf-8"?>
+<p:sld xmlns:a="http://schemas.openxmlformats.org/drawingml/2006/main" xmlns:r="http://schemas.openxmlformats.org/officeDocument/2006/relationships" xmlns:p="http://schemas.openxmlformats.org/presentationml/2006/main">
+  <p:cSld>
+    <p:bg>
+      <p:bgPr>
+        <a:solidFill>
+          <a:schemeClr val="tx1"/>
+        </a:solidFill>
+        <a:effectLst/>
+      </p:bgPr>
+    </p:bg>
+    <p:spTree>
+      <p:nvGrpSpPr>
+        <p:cNvPr id="1" name=""/>
+        <p:cNvGrpSpPr/>
+        <p:nvPr/>
+      </p:nvGrpSpPr>
+      <p:grpSpPr>
+        <a:xfrm>
+          <a:off x="0" y="0"/>
+          <a:ext cx="0" cy="0"/>
+          <a:chOff x="0" y="0"/>
+          <a:chExt cx="0" cy="0"/>
+        </a:xfrm>
+      </p:grpSpPr>
+      <p:sp>
+        <p:nvSpPr>
+          <p:cNvPr id="2" name="Title 1">
+            <a:extLst>
+              <a:ext uri="{FF2B5EF4-FFF2-40B4-BE49-F238E27FC236}">
+                <a16:creationId xmlns:a16="http://schemas.microsoft.com/office/drawing/2014/main" id="{33C2851B-1FAA-42FF-9D4D-88CF13CC765A}"/>
+              </a:ext>
+            </a:extLst>
+          </p:cNvPr>
+          <p:cNvSpPr>
+            <a:spLocks noGrp="1"/>
+          </p:cNvSpPr>
+          <p:nvPr>
+            <p:ph type="title"/>
+          </p:nvPr>
+        </p:nvSpPr>
+        <p:spPr/>
+        <p:txBody>
+          <a:bodyPr/>
+          <a:lstStyle/>
+          <a:p>
+            <a:endParaRPr lang="en-US"/>
+          </a:p>
+        </p:txBody>
+      </p:sp>
+      <p:sp>
+        <p:nvSpPr>
+          <p:cNvPr id="3" name="Content Placeholder 2">
+            <a:extLst>
+              <a:ext uri="{FF2B5EF4-FFF2-40B4-BE49-F238E27FC236}">
+                <a16:creationId xmlns:a16="http://schemas.microsoft.com/office/drawing/2014/main" id="{D8C4BA4A-14A8-4D0C-B634-F36965863343}"/>
+              </a:ext>
+            </a:extLst>
+          </p:cNvPr>
+          <p:cNvSpPr>
+            <a:spLocks noGrp="1"/>
+          </p:cNvSpPr>
+          <p:nvPr>
+            <p:ph idx="1"/>
+          </p:nvPr>
+        </p:nvSpPr>
+        <p:spPr/>
+        <p:txBody>
+          <a:bodyPr/>
+          <a:lstStyle/>
+          <a:p>
+            <a:endParaRPr lang="en-US"/>
+          </a:p>
+        </p:txBody>
+      </p:sp>
+    </p:spTree>
+    <p:extLst>
+      <p:ext uri="{BB962C8B-B14F-4D97-AF65-F5344CB8AC3E}">
+        <p14:creationId xmlns:p14="http://schemas.microsoft.com/office/powerpoint/2010/main" val="413298766"/>
+      </p:ext>
+    </p:extLst>
+  </p:cSld>
+  <p:clrMapOvr>
+    <a:masterClrMapping/>
+  </p:clrMapOvr>
+</p:sld>
+</file>
+
+<file path=ppt/slides/slide14.xml><?xml version="1.0" encoding="utf-8"?>
+<p:sld xmlns:a="http://schemas.openxmlformats.org/drawingml/2006/main" xmlns:r="http://schemas.openxmlformats.org/officeDocument/2006/relationships" xmlns:p="http://schemas.openxmlformats.org/presentationml/2006/main">
+  <p:cSld>
+    <p:spTree>
+      <p:nvGrpSpPr>
+        <p:cNvPr id="1" name=""/>
+        <p:cNvGrpSpPr/>
+        <p:nvPr/>
+      </p:nvGrpSpPr>
+      <p:grpSpPr>
+        <a:xfrm>
+          <a:off x="0" y="0"/>
+          <a:ext cx="0" cy="0"/>
+          <a:chOff x="0" y="0"/>
+          <a:chExt cx="0" cy="0"/>
+        </a:xfrm>
+      </p:grpSpPr>
+      <p:sp>
+        <p:nvSpPr>
+          <p:cNvPr id="2" name="Title 1">
+            <a:extLst>
+              <a:ext uri="{FF2B5EF4-FFF2-40B4-BE49-F238E27FC236}">
+                <a16:creationId xmlns:a16="http://schemas.microsoft.com/office/drawing/2014/main" id="{0C1E1419-D755-4EE5-A721-4D53D835F5D1}"/>
+              </a:ext>
+            </a:extLst>
+          </p:cNvPr>
+          <p:cNvSpPr>
+            <a:spLocks noGrp="1"/>
+          </p:cNvSpPr>
+          <p:nvPr>
+            <p:ph type="ctrTitle"/>
+          </p:nvPr>
+        </p:nvSpPr>
+        <p:spPr/>
+        <p:txBody>
+          <a:bodyPr/>
+          <a:lstStyle/>
+          <a:p>
+            <a:r>
+              <a:rPr lang="en-US" b="1" dirty="0">
+                <a:latin typeface="+mn-lt"/>
+              </a:rPr>
+              <a:t>PATH 4a</a:t>
+            </a:r>
+          </a:p>
+        </p:txBody>
+      </p:sp>
+      <p:sp>
+        <p:nvSpPr>
+          <p:cNvPr id="3" name="Subtitle 2">
+            <a:extLst>
+              <a:ext uri="{FF2B5EF4-FFF2-40B4-BE49-F238E27FC236}">
+                <a16:creationId xmlns:a16="http://schemas.microsoft.com/office/drawing/2014/main" id="{B0AC6204-0C0A-4559-BC12-21BAB2CE2413}"/>
+              </a:ext>
+            </a:extLst>
+          </p:cNvPr>
+          <p:cNvSpPr>
+            <a:spLocks noGrp="1"/>
+          </p:cNvSpPr>
+          <p:nvPr>
+            <p:ph type="subTitle" idx="1"/>
+          </p:nvPr>
+        </p:nvSpPr>
+        <p:spPr/>
+        <p:txBody>
+          <a:bodyPr>
+            <a:normAutofit/>
+          </a:bodyPr>
+          <a:lstStyle/>
+          <a:p>
+            <a:r>
+              <a:rPr lang="en-US" sz="7200" dirty="0"/>
+              <a:t>2-1-4</a:t>
+            </a:r>
+          </a:p>
+        </p:txBody>
+      </p:sp>
+    </p:spTree>
+    <p:extLst>
+      <p:ext uri="{BB962C8B-B14F-4D97-AF65-F5344CB8AC3E}">
+        <p14:creationId xmlns:p14="http://schemas.microsoft.com/office/powerpoint/2010/main" val="1795102718"/>
+      </p:ext>
+    </p:extLst>
+  </p:cSld>
+  <p:clrMapOvr>
+    <a:masterClrMapping/>
+  </p:clrMapOvr>
+</p:sld>
+</file>
+
+<file path=ppt/slides/slide15.xml><?xml version="1.0" encoding="utf-8"?>
+<p:sld xmlns:a="http://schemas.openxmlformats.org/drawingml/2006/main" xmlns:r="http://schemas.openxmlformats.org/officeDocument/2006/relationships" xmlns:p="http://schemas.openxmlformats.org/presentationml/2006/main">
+  <p:cSld>
+    <p:spTree>
+      <p:nvGrpSpPr>
+        <p:cNvPr id="1" name=""/>
+        <p:cNvGrpSpPr/>
+        <p:nvPr/>
+      </p:nvGrpSpPr>
+      <p:grpSpPr>
+        <a:xfrm>
+          <a:off x="0" y="0"/>
+          <a:ext cx="0" cy="0"/>
+          <a:chOff x="0" y="0"/>
+          <a:chExt cx="0" cy="0"/>
+        </a:xfrm>
+      </p:grpSpPr>
+      <p:sp>
+        <p:nvSpPr>
+          <p:cNvPr id="2" name="Title 1">
+            <a:extLst>
+              <a:ext uri="{FF2B5EF4-FFF2-40B4-BE49-F238E27FC236}">
+                <a16:creationId xmlns:a16="http://schemas.microsoft.com/office/drawing/2014/main" id="{0C1E1419-D755-4EE5-A721-4D53D835F5D1}"/>
+              </a:ext>
+            </a:extLst>
+          </p:cNvPr>
+          <p:cNvSpPr>
+            <a:spLocks noGrp="1"/>
+          </p:cNvSpPr>
+          <p:nvPr>
+            <p:ph type="ctrTitle"/>
+          </p:nvPr>
+        </p:nvSpPr>
+        <p:spPr/>
+        <p:txBody>
+          <a:bodyPr/>
+          <a:lstStyle/>
+          <a:p>
+            <a:r>
+              <a:rPr lang="en-US" b="1" dirty="0">
+                <a:latin typeface="+mn-lt"/>
+              </a:rPr>
+              <a:t>PATH 4b</a:t>
+            </a:r>
+          </a:p>
+        </p:txBody>
+      </p:sp>
+      <p:sp>
+        <p:nvSpPr>
+          <p:cNvPr id="3" name="Subtitle 2">
+            <a:extLst>
+              <a:ext uri="{FF2B5EF4-FFF2-40B4-BE49-F238E27FC236}">
+                <a16:creationId xmlns:a16="http://schemas.microsoft.com/office/drawing/2014/main" id="{B0AC6204-0C0A-4559-BC12-21BAB2CE2413}"/>
+              </a:ext>
+            </a:extLst>
+          </p:cNvPr>
+          <p:cNvSpPr>
+            <a:spLocks noGrp="1"/>
+          </p:cNvSpPr>
+          <p:nvPr>
+            <p:ph type="subTitle" idx="1"/>
+          </p:nvPr>
+        </p:nvSpPr>
+        <p:spPr/>
+        <p:txBody>
+          <a:bodyPr>
+            <a:normAutofit/>
+          </a:bodyPr>
+          <a:lstStyle/>
+          <a:p>
+            <a:r>
+              <a:rPr lang="en-US" sz="7200" dirty="0"/>
+              <a:t>2-1-4</a:t>
+            </a:r>
+          </a:p>
+        </p:txBody>
+      </p:sp>
+    </p:spTree>
+    <p:extLst>
+      <p:ext uri="{BB962C8B-B14F-4D97-AF65-F5344CB8AC3E}">
+        <p14:creationId xmlns:p14="http://schemas.microsoft.com/office/powerpoint/2010/main" val="1337122827"/>
+      </p:ext>
+    </p:extLst>
+  </p:cSld>
+  <p:clrMapOvr>
+    <a:masterClrMapping/>
+  </p:clrMapOvr>
+</p:sld>
+</file>
+
+<file path=ppt/slides/slide16.xml><?xml version="1.0" encoding="utf-8"?>
+<p:sld xmlns:a="http://schemas.openxmlformats.org/drawingml/2006/main" xmlns:r="http://schemas.openxmlformats.org/officeDocument/2006/relationships" xmlns:p="http://schemas.openxmlformats.org/presentationml/2006/main">
+  <p:cSld>
+    <p:spTree>
+      <p:nvGrpSpPr>
+        <p:cNvPr id="1" name=""/>
+        <p:cNvGrpSpPr/>
+        <p:nvPr/>
+      </p:nvGrpSpPr>
+      <p:grpSpPr>
+        <a:xfrm>
+          <a:off x="0" y="0"/>
+          <a:ext cx="0" cy="0"/>
+          <a:chOff x="0" y="0"/>
+          <a:chExt cx="0" cy="0"/>
+        </a:xfrm>
+      </p:grpSpPr>
+      <p:sp>
+        <p:nvSpPr>
+          <p:cNvPr id="2" name="Title 1">
+            <a:extLst>
+              <a:ext uri="{FF2B5EF4-FFF2-40B4-BE49-F238E27FC236}">
+                <a16:creationId xmlns:a16="http://schemas.microsoft.com/office/drawing/2014/main" id="{0C1E1419-D755-4EE5-A721-4D53D835F5D1}"/>
+              </a:ext>
+            </a:extLst>
+          </p:cNvPr>
+          <p:cNvSpPr>
+            <a:spLocks noGrp="1"/>
+          </p:cNvSpPr>
+          <p:nvPr>
+            <p:ph type="ctrTitle"/>
+          </p:nvPr>
+        </p:nvSpPr>
+        <p:spPr/>
+        <p:txBody>
+          <a:bodyPr/>
+          <a:lstStyle/>
+          <a:p>
+            <a:r>
+              <a:rPr lang="en-US" b="1" dirty="0">
+                <a:latin typeface="+mn-lt"/>
+              </a:rPr>
+              <a:t>PATH 4c</a:t>
+            </a:r>
+          </a:p>
+        </p:txBody>
+      </p:sp>
+      <p:sp>
+        <p:nvSpPr>
+          <p:cNvPr id="3" name="Subtitle 2">
+            <a:extLst>
+              <a:ext uri="{FF2B5EF4-FFF2-40B4-BE49-F238E27FC236}">
+                <a16:creationId xmlns:a16="http://schemas.microsoft.com/office/drawing/2014/main" id="{B0AC6204-0C0A-4559-BC12-21BAB2CE2413}"/>
+              </a:ext>
+            </a:extLst>
+          </p:cNvPr>
+          <p:cNvSpPr>
+            <a:spLocks noGrp="1"/>
+          </p:cNvSpPr>
+          <p:nvPr>
+            <p:ph type="subTitle" idx="1"/>
+          </p:nvPr>
+        </p:nvSpPr>
+        <p:spPr/>
+        <p:txBody>
+          <a:bodyPr>
+            <a:normAutofit/>
+          </a:bodyPr>
+          <a:lstStyle/>
+          <a:p>
+            <a:r>
+              <a:rPr lang="en-US" sz="7200" dirty="0"/>
+              <a:t>2-1-4</a:t>
+            </a:r>
+          </a:p>
+        </p:txBody>
+      </p:sp>
+    </p:spTree>
+    <p:extLst>
+      <p:ext uri="{BB962C8B-B14F-4D97-AF65-F5344CB8AC3E}">
+        <p14:creationId xmlns:p14="http://schemas.microsoft.com/office/powerpoint/2010/main" val="141773270"/>
+      </p:ext>
+    </p:extLst>
+  </p:cSld>
+  <p:clrMapOvr>
+    <a:masterClrMapping/>
+  </p:clrMapOvr>
+</p:sld>
+</file>
+
+<file path=ppt/slides/slide17.xml><?xml version="1.0" encoding="utf-8"?>
+<p:sld xmlns:a="http://schemas.openxmlformats.org/drawingml/2006/main" xmlns:r="http://schemas.openxmlformats.org/officeDocument/2006/relationships" xmlns:p="http://schemas.openxmlformats.org/presentationml/2006/main">
+  <p:cSld>
+    <p:spTree>
+      <p:nvGrpSpPr>
+        <p:cNvPr id="1" name=""/>
+        <p:cNvGrpSpPr/>
+        <p:nvPr/>
+      </p:nvGrpSpPr>
+      <p:grpSpPr>
+        <a:xfrm>
+          <a:off x="0" y="0"/>
+          <a:ext cx="0" cy="0"/>
+          <a:chOff x="0" y="0"/>
+          <a:chExt cx="0" cy="0"/>
+        </a:xfrm>
+      </p:grpSpPr>
+      <p:sp>
+        <p:nvSpPr>
+          <p:cNvPr id="2" name="Title 1">
+            <a:extLst>
+              <a:ext uri="{FF2B5EF4-FFF2-40B4-BE49-F238E27FC236}">
+                <a16:creationId xmlns:a16="http://schemas.microsoft.com/office/drawing/2014/main" id="{0C1E1419-D755-4EE5-A721-4D53D835F5D1}"/>
+              </a:ext>
+            </a:extLst>
+          </p:cNvPr>
+          <p:cNvSpPr>
+            <a:spLocks noGrp="1"/>
+          </p:cNvSpPr>
+          <p:nvPr>
+            <p:ph type="ctrTitle"/>
+          </p:nvPr>
+        </p:nvSpPr>
+        <p:spPr/>
+        <p:txBody>
+          <a:bodyPr/>
+          <a:lstStyle/>
+          <a:p>
+            <a:r>
+              <a:rPr lang="en-US" b="1" dirty="0">
+                <a:latin typeface="+mn-lt"/>
+              </a:rPr>
+              <a:t>PATH 4d</a:t>
+            </a:r>
+          </a:p>
+        </p:txBody>
+      </p:sp>
+      <p:sp>
+        <p:nvSpPr>
+          <p:cNvPr id="3" name="Subtitle 2">
+            <a:extLst>
+              <a:ext uri="{FF2B5EF4-FFF2-40B4-BE49-F238E27FC236}">
+                <a16:creationId xmlns:a16="http://schemas.microsoft.com/office/drawing/2014/main" id="{B0AC6204-0C0A-4559-BC12-21BAB2CE2413}"/>
+              </a:ext>
+            </a:extLst>
+          </p:cNvPr>
+          <p:cNvSpPr>
+            <a:spLocks noGrp="1"/>
+          </p:cNvSpPr>
+          <p:nvPr>
+            <p:ph type="subTitle" idx="1"/>
+          </p:nvPr>
+        </p:nvSpPr>
+        <p:spPr/>
+        <p:txBody>
+          <a:bodyPr>
+            <a:normAutofit/>
+          </a:bodyPr>
+          <a:lstStyle/>
+          <a:p>
+            <a:r>
+              <a:rPr lang="en-US" sz="7200" dirty="0"/>
+              <a:t>2-1-4</a:t>
+            </a:r>
+          </a:p>
+        </p:txBody>
+      </p:sp>
+    </p:spTree>
+    <p:extLst>
+      <p:ext uri="{BB962C8B-B14F-4D97-AF65-F5344CB8AC3E}">
+        <p14:creationId xmlns:p14="http://schemas.microsoft.com/office/powerpoint/2010/main" val="1368794891"/>
+      </p:ext>
+    </p:extLst>
+  </p:cSld>
+  <p:clrMapOvr>
+    <a:masterClrMapping/>
+  </p:clrMapOvr>
+</p:sld>
+</file>
+
+<file path=ppt/slides/slide18.xml><?xml version="1.0" encoding="utf-8"?>
+<p:sld xmlns:a="http://schemas.openxmlformats.org/drawingml/2006/main" xmlns:r="http://schemas.openxmlformats.org/officeDocument/2006/relationships" xmlns:p="http://schemas.openxmlformats.org/presentationml/2006/main">
+  <p:cSld>
+    <p:spTree>
+      <p:nvGrpSpPr>
+        <p:cNvPr id="1" name=""/>
+        <p:cNvGrpSpPr/>
+        <p:nvPr/>
+      </p:nvGrpSpPr>
+      <p:grpSpPr>
+        <a:xfrm>
+          <a:off x="0" y="0"/>
+          <a:ext cx="0" cy="0"/>
+          <a:chOff x="0" y="0"/>
+          <a:chExt cx="0" cy="0"/>
+        </a:xfrm>
+      </p:grpSpPr>
+      <p:sp>
+        <p:nvSpPr>
+          <p:cNvPr id="2" name="Title 1">
+            <a:extLst>
+              <a:ext uri="{FF2B5EF4-FFF2-40B4-BE49-F238E27FC236}">
+                <a16:creationId xmlns:a16="http://schemas.microsoft.com/office/drawing/2014/main" id="{0C1E1419-D755-4EE5-A721-4D53D835F5D1}"/>
+              </a:ext>
+            </a:extLst>
+          </p:cNvPr>
+          <p:cNvSpPr>
+            <a:spLocks noGrp="1"/>
+          </p:cNvSpPr>
+          <p:nvPr>
+            <p:ph type="ctrTitle"/>
+          </p:nvPr>
+        </p:nvSpPr>
+        <p:spPr/>
+        <p:txBody>
+          <a:bodyPr/>
+          <a:lstStyle/>
+          <a:p>
+            <a:r>
+              <a:rPr lang="en-US" b="1" dirty="0">
+                <a:latin typeface="+mn-lt"/>
+              </a:rPr>
+              <a:t>PATH 5a</a:t>
+            </a:r>
+          </a:p>
+        </p:txBody>
+      </p:sp>
+      <p:sp>
+        <p:nvSpPr>
+          <p:cNvPr id="3" name="Subtitle 2">
+            <a:extLst>
+              <a:ext uri="{FF2B5EF4-FFF2-40B4-BE49-F238E27FC236}">
+                <a16:creationId xmlns:a16="http://schemas.microsoft.com/office/drawing/2014/main" id="{B0AC6204-0C0A-4559-BC12-21BAB2CE2413}"/>
+              </a:ext>
+            </a:extLst>
+          </p:cNvPr>
+          <p:cNvSpPr>
+            <a:spLocks noGrp="1"/>
+          </p:cNvSpPr>
+          <p:nvPr>
+            <p:ph type="subTitle" idx="1"/>
+          </p:nvPr>
+        </p:nvSpPr>
+        <p:spPr/>
+        <p:txBody>
+          <a:bodyPr>
+            <a:normAutofit/>
+          </a:bodyPr>
+          <a:lstStyle/>
+          <a:p>
+            <a:r>
+              <a:rPr lang="en-US" sz="7200" dirty="0"/>
+              <a:t>2-3-4</a:t>
+            </a:r>
+          </a:p>
+        </p:txBody>
+      </p:sp>
+    </p:spTree>
+    <p:extLst>
+      <p:ext uri="{BB962C8B-B14F-4D97-AF65-F5344CB8AC3E}">
+        <p14:creationId xmlns:p14="http://schemas.microsoft.com/office/powerpoint/2010/main" val="1534857246"/>
+      </p:ext>
+    </p:extLst>
+  </p:cSld>
+  <p:clrMapOvr>
+    <a:masterClrMapping/>
+  </p:clrMapOvr>
+</p:sld>
+</file>
+
+<file path=ppt/slides/slide19.xml><?xml version="1.0" encoding="utf-8"?>
+<p:sld xmlns:a="http://schemas.openxmlformats.org/drawingml/2006/main" xmlns:r="http://schemas.openxmlformats.org/officeDocument/2006/relationships" xmlns:p="http://schemas.openxmlformats.org/presentationml/2006/main">
+  <p:cSld>
+    <p:spTree>
+      <p:nvGrpSpPr>
+        <p:cNvPr id="1" name=""/>
+        <p:cNvGrpSpPr/>
+        <p:nvPr/>
+      </p:nvGrpSpPr>
+      <p:grpSpPr>
+        <a:xfrm>
+          <a:off x="0" y="0"/>
+          <a:ext cx="0" cy="0"/>
+          <a:chOff x="0" y="0"/>
+          <a:chExt cx="0" cy="0"/>
+        </a:xfrm>
+      </p:grpSpPr>
+      <p:sp>
+        <p:nvSpPr>
+          <p:cNvPr id="2" name="Title 1">
+            <a:extLst>
+              <a:ext uri="{FF2B5EF4-FFF2-40B4-BE49-F238E27FC236}">
+                <a16:creationId xmlns:a16="http://schemas.microsoft.com/office/drawing/2014/main" id="{0C1E1419-D755-4EE5-A721-4D53D835F5D1}"/>
+              </a:ext>
+            </a:extLst>
+          </p:cNvPr>
+          <p:cNvSpPr>
+            <a:spLocks noGrp="1"/>
+          </p:cNvSpPr>
+          <p:nvPr>
+            <p:ph type="ctrTitle"/>
+          </p:nvPr>
+        </p:nvSpPr>
+        <p:spPr/>
+        <p:txBody>
+          <a:bodyPr/>
+          <a:lstStyle/>
+          <a:p>
+            <a:r>
+              <a:rPr lang="en-US" b="1" dirty="0">
+                <a:latin typeface="+mn-lt"/>
+              </a:rPr>
+              <a:t>PATH 5b</a:t>
+            </a:r>
+          </a:p>
+        </p:txBody>
+      </p:sp>
+      <p:sp>
+        <p:nvSpPr>
+          <p:cNvPr id="3" name="Subtitle 2">
+            <a:extLst>
+              <a:ext uri="{FF2B5EF4-FFF2-40B4-BE49-F238E27FC236}">
+                <a16:creationId xmlns:a16="http://schemas.microsoft.com/office/drawing/2014/main" id="{B0AC6204-0C0A-4559-BC12-21BAB2CE2413}"/>
+              </a:ext>
+            </a:extLst>
+          </p:cNvPr>
+          <p:cNvSpPr>
+            <a:spLocks noGrp="1"/>
+          </p:cNvSpPr>
+          <p:nvPr>
+            <p:ph type="subTitle" idx="1"/>
+          </p:nvPr>
+        </p:nvSpPr>
+        <p:spPr/>
+        <p:txBody>
+          <a:bodyPr>
+            <a:normAutofit/>
+          </a:bodyPr>
+          <a:lstStyle/>
+          <a:p>
+            <a:r>
+              <a:rPr lang="en-US" sz="7200" dirty="0"/>
+              <a:t>2-3-4</a:t>
+            </a:r>
+          </a:p>
+        </p:txBody>
+      </p:sp>
+    </p:spTree>
+    <p:extLst>
+      <p:ext uri="{BB962C8B-B14F-4D97-AF65-F5344CB8AC3E}">
+        <p14:creationId xmlns:p14="http://schemas.microsoft.com/office/powerpoint/2010/main" val="3966998061"/>
+      </p:ext>
+    </p:extLst>
+  </p:cSld>
+  <p:clrMapOvr>
+    <a:masterClrMapping/>
+  </p:clrMapOvr>
+</p:sld>
+</file>
+
 <file path=ppt/slides/slide2.xml><?xml version="1.0" encoding="utf-8"?>
 <p:sld xmlns:a="http://schemas.openxmlformats.org/drawingml/2006/main" xmlns:r="http://schemas.openxmlformats.org/officeDocument/2006/relationships" xmlns:p="http://schemas.openxmlformats.org/presentationml/2006/main">
   <p:cSld>
@@ -3478,6 +4428,904 @@
     <p:extLst>
       <p:ext uri="{BB962C8B-B14F-4D97-AF65-F5344CB8AC3E}">
         <p14:creationId xmlns:p14="http://schemas.microsoft.com/office/powerpoint/2010/main" val="4025507198"/>
+      </p:ext>
+    </p:extLst>
+  </p:cSld>
+  <p:clrMapOvr>
+    <a:masterClrMapping/>
+  </p:clrMapOvr>
+</p:sld>
+</file>
+
+<file path=ppt/slides/slide20.xml><?xml version="1.0" encoding="utf-8"?>
+<p:sld xmlns:a="http://schemas.openxmlformats.org/drawingml/2006/main" xmlns:r="http://schemas.openxmlformats.org/officeDocument/2006/relationships" xmlns:p="http://schemas.openxmlformats.org/presentationml/2006/main">
+  <p:cSld>
+    <p:spTree>
+      <p:nvGrpSpPr>
+        <p:cNvPr id="1" name=""/>
+        <p:cNvGrpSpPr/>
+        <p:nvPr/>
+      </p:nvGrpSpPr>
+      <p:grpSpPr>
+        <a:xfrm>
+          <a:off x="0" y="0"/>
+          <a:ext cx="0" cy="0"/>
+          <a:chOff x="0" y="0"/>
+          <a:chExt cx="0" cy="0"/>
+        </a:xfrm>
+      </p:grpSpPr>
+      <p:sp>
+        <p:nvSpPr>
+          <p:cNvPr id="2" name="Title 1">
+            <a:extLst>
+              <a:ext uri="{FF2B5EF4-FFF2-40B4-BE49-F238E27FC236}">
+                <a16:creationId xmlns:a16="http://schemas.microsoft.com/office/drawing/2014/main" id="{0C1E1419-D755-4EE5-A721-4D53D835F5D1}"/>
+              </a:ext>
+            </a:extLst>
+          </p:cNvPr>
+          <p:cNvSpPr>
+            <a:spLocks noGrp="1"/>
+          </p:cNvSpPr>
+          <p:nvPr>
+            <p:ph type="ctrTitle"/>
+          </p:nvPr>
+        </p:nvSpPr>
+        <p:spPr/>
+        <p:txBody>
+          <a:bodyPr/>
+          <a:lstStyle/>
+          <a:p>
+            <a:r>
+              <a:rPr lang="en-US" b="1" dirty="0">
+                <a:latin typeface="+mn-lt"/>
+              </a:rPr>
+              <a:t>PATH 5c</a:t>
+            </a:r>
+          </a:p>
+        </p:txBody>
+      </p:sp>
+      <p:sp>
+        <p:nvSpPr>
+          <p:cNvPr id="3" name="Subtitle 2">
+            <a:extLst>
+              <a:ext uri="{FF2B5EF4-FFF2-40B4-BE49-F238E27FC236}">
+                <a16:creationId xmlns:a16="http://schemas.microsoft.com/office/drawing/2014/main" id="{B0AC6204-0C0A-4559-BC12-21BAB2CE2413}"/>
+              </a:ext>
+            </a:extLst>
+          </p:cNvPr>
+          <p:cNvSpPr>
+            <a:spLocks noGrp="1"/>
+          </p:cNvSpPr>
+          <p:nvPr>
+            <p:ph type="subTitle" idx="1"/>
+          </p:nvPr>
+        </p:nvSpPr>
+        <p:spPr/>
+        <p:txBody>
+          <a:bodyPr>
+            <a:normAutofit/>
+          </a:bodyPr>
+          <a:lstStyle/>
+          <a:p>
+            <a:r>
+              <a:rPr lang="en-US" sz="7200" dirty="0"/>
+              <a:t>2-3-4</a:t>
+            </a:r>
+          </a:p>
+        </p:txBody>
+      </p:sp>
+    </p:spTree>
+    <p:extLst>
+      <p:ext uri="{BB962C8B-B14F-4D97-AF65-F5344CB8AC3E}">
+        <p14:creationId xmlns:p14="http://schemas.microsoft.com/office/powerpoint/2010/main" val="3291621192"/>
+      </p:ext>
+    </p:extLst>
+  </p:cSld>
+  <p:clrMapOvr>
+    <a:masterClrMapping/>
+  </p:clrMapOvr>
+</p:sld>
+</file>
+
+<file path=ppt/slides/slide21.xml><?xml version="1.0" encoding="utf-8"?>
+<p:sld xmlns:a="http://schemas.openxmlformats.org/drawingml/2006/main" xmlns:r="http://schemas.openxmlformats.org/officeDocument/2006/relationships" xmlns:p="http://schemas.openxmlformats.org/presentationml/2006/main">
+  <p:cSld>
+    <p:spTree>
+      <p:nvGrpSpPr>
+        <p:cNvPr id="1" name=""/>
+        <p:cNvGrpSpPr/>
+        <p:nvPr/>
+      </p:nvGrpSpPr>
+      <p:grpSpPr>
+        <a:xfrm>
+          <a:off x="0" y="0"/>
+          <a:ext cx="0" cy="0"/>
+          <a:chOff x="0" y="0"/>
+          <a:chExt cx="0" cy="0"/>
+        </a:xfrm>
+      </p:grpSpPr>
+      <p:sp>
+        <p:nvSpPr>
+          <p:cNvPr id="2" name="Title 1">
+            <a:extLst>
+              <a:ext uri="{FF2B5EF4-FFF2-40B4-BE49-F238E27FC236}">
+                <a16:creationId xmlns:a16="http://schemas.microsoft.com/office/drawing/2014/main" id="{0C1E1419-D755-4EE5-A721-4D53D835F5D1}"/>
+              </a:ext>
+            </a:extLst>
+          </p:cNvPr>
+          <p:cNvSpPr>
+            <a:spLocks noGrp="1"/>
+          </p:cNvSpPr>
+          <p:nvPr>
+            <p:ph type="ctrTitle"/>
+          </p:nvPr>
+        </p:nvSpPr>
+        <p:spPr/>
+        <p:txBody>
+          <a:bodyPr/>
+          <a:lstStyle/>
+          <a:p>
+            <a:r>
+              <a:rPr lang="en-US" b="1" dirty="0">
+                <a:latin typeface="+mn-lt"/>
+              </a:rPr>
+              <a:t>PATH 5d</a:t>
+            </a:r>
+          </a:p>
+        </p:txBody>
+      </p:sp>
+      <p:sp>
+        <p:nvSpPr>
+          <p:cNvPr id="3" name="Subtitle 2">
+            <a:extLst>
+              <a:ext uri="{FF2B5EF4-FFF2-40B4-BE49-F238E27FC236}">
+                <a16:creationId xmlns:a16="http://schemas.microsoft.com/office/drawing/2014/main" id="{B0AC6204-0C0A-4559-BC12-21BAB2CE2413}"/>
+              </a:ext>
+            </a:extLst>
+          </p:cNvPr>
+          <p:cNvSpPr>
+            <a:spLocks noGrp="1"/>
+          </p:cNvSpPr>
+          <p:nvPr>
+            <p:ph type="subTitle" idx="1"/>
+          </p:nvPr>
+        </p:nvSpPr>
+        <p:spPr/>
+        <p:txBody>
+          <a:bodyPr>
+            <a:normAutofit/>
+          </a:bodyPr>
+          <a:lstStyle/>
+          <a:p>
+            <a:r>
+              <a:rPr lang="en-US" sz="7200" dirty="0"/>
+              <a:t>2-3-4</a:t>
+            </a:r>
+          </a:p>
+        </p:txBody>
+      </p:sp>
+    </p:spTree>
+    <p:extLst>
+      <p:ext uri="{BB962C8B-B14F-4D97-AF65-F5344CB8AC3E}">
+        <p14:creationId xmlns:p14="http://schemas.microsoft.com/office/powerpoint/2010/main" val="29537447"/>
+      </p:ext>
+    </p:extLst>
+  </p:cSld>
+  <p:clrMapOvr>
+    <a:masterClrMapping/>
+  </p:clrMapOvr>
+</p:sld>
+</file>
+
+<file path=ppt/slides/slide22.xml><?xml version="1.0" encoding="utf-8"?>
+<p:sld xmlns:a="http://schemas.openxmlformats.org/drawingml/2006/main" xmlns:r="http://schemas.openxmlformats.org/officeDocument/2006/relationships" xmlns:p="http://schemas.openxmlformats.org/presentationml/2006/main">
+  <p:cSld>
+    <p:spTree>
+      <p:nvGrpSpPr>
+        <p:cNvPr id="1" name=""/>
+        <p:cNvGrpSpPr/>
+        <p:nvPr/>
+      </p:nvGrpSpPr>
+      <p:grpSpPr>
+        <a:xfrm>
+          <a:off x="0" y="0"/>
+          <a:ext cx="0" cy="0"/>
+          <a:chOff x="0" y="0"/>
+          <a:chExt cx="0" cy="0"/>
+        </a:xfrm>
+      </p:grpSpPr>
+      <p:sp>
+        <p:nvSpPr>
+          <p:cNvPr id="2" name="Title 1">
+            <a:extLst>
+              <a:ext uri="{FF2B5EF4-FFF2-40B4-BE49-F238E27FC236}">
+                <a16:creationId xmlns:a16="http://schemas.microsoft.com/office/drawing/2014/main" id="{0C1E1419-D755-4EE5-A721-4D53D835F5D1}"/>
+              </a:ext>
+            </a:extLst>
+          </p:cNvPr>
+          <p:cNvSpPr>
+            <a:spLocks noGrp="1"/>
+          </p:cNvSpPr>
+          <p:nvPr>
+            <p:ph type="ctrTitle"/>
+          </p:nvPr>
+        </p:nvSpPr>
+        <p:spPr/>
+        <p:txBody>
+          <a:bodyPr/>
+          <a:lstStyle/>
+          <a:p>
+            <a:r>
+              <a:rPr lang="en-US" b="1" dirty="0">
+                <a:latin typeface="+mn-lt"/>
+              </a:rPr>
+              <a:t>PATH 6a</a:t>
+            </a:r>
+          </a:p>
+        </p:txBody>
+      </p:sp>
+      <p:sp>
+        <p:nvSpPr>
+          <p:cNvPr id="3" name="Subtitle 2">
+            <a:extLst>
+              <a:ext uri="{FF2B5EF4-FFF2-40B4-BE49-F238E27FC236}">
+                <a16:creationId xmlns:a16="http://schemas.microsoft.com/office/drawing/2014/main" id="{B0AC6204-0C0A-4559-BC12-21BAB2CE2413}"/>
+              </a:ext>
+            </a:extLst>
+          </p:cNvPr>
+          <p:cNvSpPr>
+            <a:spLocks noGrp="1"/>
+          </p:cNvSpPr>
+          <p:nvPr>
+            <p:ph type="subTitle" idx="1"/>
+          </p:nvPr>
+        </p:nvSpPr>
+        <p:spPr/>
+        <p:txBody>
+          <a:bodyPr>
+            <a:normAutofit/>
+          </a:bodyPr>
+          <a:lstStyle/>
+          <a:p>
+            <a:r>
+              <a:rPr lang="en-US" sz="7200" dirty="0"/>
+              <a:t>2-2-4</a:t>
+            </a:r>
+          </a:p>
+        </p:txBody>
+      </p:sp>
+    </p:spTree>
+    <p:extLst>
+      <p:ext uri="{BB962C8B-B14F-4D97-AF65-F5344CB8AC3E}">
+        <p14:creationId xmlns:p14="http://schemas.microsoft.com/office/powerpoint/2010/main" val="908176948"/>
+      </p:ext>
+    </p:extLst>
+  </p:cSld>
+  <p:clrMapOvr>
+    <a:masterClrMapping/>
+  </p:clrMapOvr>
+</p:sld>
+</file>
+
+<file path=ppt/slides/slide23.xml><?xml version="1.0" encoding="utf-8"?>
+<p:sld xmlns:a="http://schemas.openxmlformats.org/drawingml/2006/main" xmlns:r="http://schemas.openxmlformats.org/officeDocument/2006/relationships" xmlns:p="http://schemas.openxmlformats.org/presentationml/2006/main">
+  <p:cSld>
+    <p:spTree>
+      <p:nvGrpSpPr>
+        <p:cNvPr id="1" name=""/>
+        <p:cNvGrpSpPr/>
+        <p:nvPr/>
+      </p:nvGrpSpPr>
+      <p:grpSpPr>
+        <a:xfrm>
+          <a:off x="0" y="0"/>
+          <a:ext cx="0" cy="0"/>
+          <a:chOff x="0" y="0"/>
+          <a:chExt cx="0" cy="0"/>
+        </a:xfrm>
+      </p:grpSpPr>
+      <p:sp>
+        <p:nvSpPr>
+          <p:cNvPr id="2" name="Title 1">
+            <a:extLst>
+              <a:ext uri="{FF2B5EF4-FFF2-40B4-BE49-F238E27FC236}">
+                <a16:creationId xmlns:a16="http://schemas.microsoft.com/office/drawing/2014/main" id="{0C1E1419-D755-4EE5-A721-4D53D835F5D1}"/>
+              </a:ext>
+            </a:extLst>
+          </p:cNvPr>
+          <p:cNvSpPr>
+            <a:spLocks noGrp="1"/>
+          </p:cNvSpPr>
+          <p:nvPr>
+            <p:ph type="ctrTitle"/>
+          </p:nvPr>
+        </p:nvSpPr>
+        <p:spPr/>
+        <p:txBody>
+          <a:bodyPr/>
+          <a:lstStyle/>
+          <a:p>
+            <a:r>
+              <a:rPr lang="en-US" b="1" dirty="0">
+                <a:latin typeface="+mn-lt"/>
+              </a:rPr>
+              <a:t>PATH 6b</a:t>
+            </a:r>
+          </a:p>
+        </p:txBody>
+      </p:sp>
+      <p:sp>
+        <p:nvSpPr>
+          <p:cNvPr id="3" name="Subtitle 2">
+            <a:extLst>
+              <a:ext uri="{FF2B5EF4-FFF2-40B4-BE49-F238E27FC236}">
+                <a16:creationId xmlns:a16="http://schemas.microsoft.com/office/drawing/2014/main" id="{B0AC6204-0C0A-4559-BC12-21BAB2CE2413}"/>
+              </a:ext>
+            </a:extLst>
+          </p:cNvPr>
+          <p:cNvSpPr>
+            <a:spLocks noGrp="1"/>
+          </p:cNvSpPr>
+          <p:nvPr>
+            <p:ph type="subTitle" idx="1"/>
+          </p:nvPr>
+        </p:nvSpPr>
+        <p:spPr/>
+        <p:txBody>
+          <a:bodyPr>
+            <a:normAutofit/>
+          </a:bodyPr>
+          <a:lstStyle/>
+          <a:p>
+            <a:r>
+              <a:rPr lang="en-US" sz="7200" dirty="0"/>
+              <a:t>2-2-4</a:t>
+            </a:r>
+          </a:p>
+        </p:txBody>
+      </p:sp>
+    </p:spTree>
+    <p:extLst>
+      <p:ext uri="{BB962C8B-B14F-4D97-AF65-F5344CB8AC3E}">
+        <p14:creationId xmlns:p14="http://schemas.microsoft.com/office/powerpoint/2010/main" val="1389178814"/>
+      </p:ext>
+    </p:extLst>
+  </p:cSld>
+  <p:clrMapOvr>
+    <a:masterClrMapping/>
+  </p:clrMapOvr>
+</p:sld>
+</file>
+
+<file path=ppt/slides/slide24.xml><?xml version="1.0" encoding="utf-8"?>
+<p:sld xmlns:a="http://schemas.openxmlformats.org/drawingml/2006/main" xmlns:r="http://schemas.openxmlformats.org/officeDocument/2006/relationships" xmlns:p="http://schemas.openxmlformats.org/presentationml/2006/main">
+  <p:cSld>
+    <p:spTree>
+      <p:nvGrpSpPr>
+        <p:cNvPr id="1" name=""/>
+        <p:cNvGrpSpPr/>
+        <p:nvPr/>
+      </p:nvGrpSpPr>
+      <p:grpSpPr>
+        <a:xfrm>
+          <a:off x="0" y="0"/>
+          <a:ext cx="0" cy="0"/>
+          <a:chOff x="0" y="0"/>
+          <a:chExt cx="0" cy="0"/>
+        </a:xfrm>
+      </p:grpSpPr>
+      <p:sp>
+        <p:nvSpPr>
+          <p:cNvPr id="2" name="Title 1">
+            <a:extLst>
+              <a:ext uri="{FF2B5EF4-FFF2-40B4-BE49-F238E27FC236}">
+                <a16:creationId xmlns:a16="http://schemas.microsoft.com/office/drawing/2014/main" id="{0C1E1419-D755-4EE5-A721-4D53D835F5D1}"/>
+              </a:ext>
+            </a:extLst>
+          </p:cNvPr>
+          <p:cNvSpPr>
+            <a:spLocks noGrp="1"/>
+          </p:cNvSpPr>
+          <p:nvPr>
+            <p:ph type="ctrTitle"/>
+          </p:nvPr>
+        </p:nvSpPr>
+        <p:spPr/>
+        <p:txBody>
+          <a:bodyPr/>
+          <a:lstStyle/>
+          <a:p>
+            <a:r>
+              <a:rPr lang="en-US" b="1" dirty="0">
+                <a:latin typeface="+mn-lt"/>
+              </a:rPr>
+              <a:t>PATH 6c</a:t>
+            </a:r>
+          </a:p>
+        </p:txBody>
+      </p:sp>
+      <p:sp>
+        <p:nvSpPr>
+          <p:cNvPr id="3" name="Subtitle 2">
+            <a:extLst>
+              <a:ext uri="{FF2B5EF4-FFF2-40B4-BE49-F238E27FC236}">
+                <a16:creationId xmlns:a16="http://schemas.microsoft.com/office/drawing/2014/main" id="{B0AC6204-0C0A-4559-BC12-21BAB2CE2413}"/>
+              </a:ext>
+            </a:extLst>
+          </p:cNvPr>
+          <p:cNvSpPr>
+            <a:spLocks noGrp="1"/>
+          </p:cNvSpPr>
+          <p:nvPr>
+            <p:ph type="subTitle" idx="1"/>
+          </p:nvPr>
+        </p:nvSpPr>
+        <p:spPr/>
+        <p:txBody>
+          <a:bodyPr>
+            <a:normAutofit/>
+          </a:bodyPr>
+          <a:lstStyle/>
+          <a:p>
+            <a:r>
+              <a:rPr lang="en-US" sz="7200" dirty="0"/>
+              <a:t>2-2-4</a:t>
+            </a:r>
+          </a:p>
+        </p:txBody>
+      </p:sp>
+    </p:spTree>
+    <p:extLst>
+      <p:ext uri="{BB962C8B-B14F-4D97-AF65-F5344CB8AC3E}">
+        <p14:creationId xmlns:p14="http://schemas.microsoft.com/office/powerpoint/2010/main" val="477843807"/>
+      </p:ext>
+    </p:extLst>
+  </p:cSld>
+  <p:clrMapOvr>
+    <a:masterClrMapping/>
+  </p:clrMapOvr>
+</p:sld>
+</file>
+
+<file path=ppt/slides/slide25.xml><?xml version="1.0" encoding="utf-8"?>
+<p:sld xmlns:a="http://schemas.openxmlformats.org/drawingml/2006/main" xmlns:r="http://schemas.openxmlformats.org/officeDocument/2006/relationships" xmlns:p="http://schemas.openxmlformats.org/presentationml/2006/main">
+  <p:cSld>
+    <p:spTree>
+      <p:nvGrpSpPr>
+        <p:cNvPr id="1" name=""/>
+        <p:cNvGrpSpPr/>
+        <p:nvPr/>
+      </p:nvGrpSpPr>
+      <p:grpSpPr>
+        <a:xfrm>
+          <a:off x="0" y="0"/>
+          <a:ext cx="0" cy="0"/>
+          <a:chOff x="0" y="0"/>
+          <a:chExt cx="0" cy="0"/>
+        </a:xfrm>
+      </p:grpSpPr>
+      <p:sp>
+        <p:nvSpPr>
+          <p:cNvPr id="2" name="Title 1">
+            <a:extLst>
+              <a:ext uri="{FF2B5EF4-FFF2-40B4-BE49-F238E27FC236}">
+                <a16:creationId xmlns:a16="http://schemas.microsoft.com/office/drawing/2014/main" id="{0C1E1419-D755-4EE5-A721-4D53D835F5D1}"/>
+              </a:ext>
+            </a:extLst>
+          </p:cNvPr>
+          <p:cNvSpPr>
+            <a:spLocks noGrp="1"/>
+          </p:cNvSpPr>
+          <p:nvPr>
+            <p:ph type="ctrTitle"/>
+          </p:nvPr>
+        </p:nvSpPr>
+        <p:spPr/>
+        <p:txBody>
+          <a:bodyPr/>
+          <a:lstStyle/>
+          <a:p>
+            <a:r>
+              <a:rPr lang="en-US" b="1" dirty="0">
+                <a:latin typeface="+mn-lt"/>
+              </a:rPr>
+              <a:t>PATH 6d</a:t>
+            </a:r>
+          </a:p>
+        </p:txBody>
+      </p:sp>
+      <p:sp>
+        <p:nvSpPr>
+          <p:cNvPr id="3" name="Subtitle 2">
+            <a:extLst>
+              <a:ext uri="{FF2B5EF4-FFF2-40B4-BE49-F238E27FC236}">
+                <a16:creationId xmlns:a16="http://schemas.microsoft.com/office/drawing/2014/main" id="{B0AC6204-0C0A-4559-BC12-21BAB2CE2413}"/>
+              </a:ext>
+            </a:extLst>
+          </p:cNvPr>
+          <p:cNvSpPr>
+            <a:spLocks noGrp="1"/>
+          </p:cNvSpPr>
+          <p:nvPr>
+            <p:ph type="subTitle" idx="1"/>
+          </p:nvPr>
+        </p:nvSpPr>
+        <p:spPr/>
+        <p:txBody>
+          <a:bodyPr>
+            <a:normAutofit/>
+          </a:bodyPr>
+          <a:lstStyle/>
+          <a:p>
+            <a:r>
+              <a:rPr lang="en-US" sz="7200" dirty="0"/>
+              <a:t>2-2-4</a:t>
+            </a:r>
+          </a:p>
+        </p:txBody>
+      </p:sp>
+    </p:spTree>
+    <p:extLst>
+      <p:ext uri="{BB962C8B-B14F-4D97-AF65-F5344CB8AC3E}">
+        <p14:creationId xmlns:p14="http://schemas.microsoft.com/office/powerpoint/2010/main" val="1180686942"/>
+      </p:ext>
+    </p:extLst>
+  </p:cSld>
+  <p:clrMapOvr>
+    <a:masterClrMapping/>
+  </p:clrMapOvr>
+</p:sld>
+</file>
+
+<file path=ppt/slides/slide26.xml><?xml version="1.0" encoding="utf-8"?>
+<p:sld xmlns:a="http://schemas.openxmlformats.org/drawingml/2006/main" xmlns:r="http://schemas.openxmlformats.org/officeDocument/2006/relationships" xmlns:p="http://schemas.openxmlformats.org/presentationml/2006/main">
+  <p:cSld>
+    <p:bg>
+      <p:bgPr>
+        <a:solidFill>
+          <a:schemeClr val="tx1"/>
+        </a:solidFill>
+        <a:effectLst/>
+      </p:bgPr>
+    </p:bg>
+    <p:spTree>
+      <p:nvGrpSpPr>
+        <p:cNvPr id="1" name=""/>
+        <p:cNvGrpSpPr/>
+        <p:nvPr/>
+      </p:nvGrpSpPr>
+      <p:grpSpPr>
+        <a:xfrm>
+          <a:off x="0" y="0"/>
+          <a:ext cx="0" cy="0"/>
+          <a:chOff x="0" y="0"/>
+          <a:chExt cx="0" cy="0"/>
+        </a:xfrm>
+      </p:grpSpPr>
+      <p:sp>
+        <p:nvSpPr>
+          <p:cNvPr id="2" name="Title 1">
+            <a:extLst>
+              <a:ext uri="{FF2B5EF4-FFF2-40B4-BE49-F238E27FC236}">
+                <a16:creationId xmlns:a16="http://schemas.microsoft.com/office/drawing/2014/main" id="{33C2851B-1FAA-42FF-9D4D-88CF13CC765A}"/>
+              </a:ext>
+            </a:extLst>
+          </p:cNvPr>
+          <p:cNvSpPr>
+            <a:spLocks noGrp="1"/>
+          </p:cNvSpPr>
+          <p:nvPr>
+            <p:ph type="title"/>
+          </p:nvPr>
+        </p:nvSpPr>
+        <p:spPr/>
+        <p:txBody>
+          <a:bodyPr/>
+          <a:lstStyle/>
+          <a:p>
+            <a:endParaRPr lang="en-US"/>
+          </a:p>
+        </p:txBody>
+      </p:sp>
+      <p:sp>
+        <p:nvSpPr>
+          <p:cNvPr id="3" name="Content Placeholder 2">
+            <a:extLst>
+              <a:ext uri="{FF2B5EF4-FFF2-40B4-BE49-F238E27FC236}">
+                <a16:creationId xmlns:a16="http://schemas.microsoft.com/office/drawing/2014/main" id="{D8C4BA4A-14A8-4D0C-B634-F36965863343}"/>
+              </a:ext>
+            </a:extLst>
+          </p:cNvPr>
+          <p:cNvSpPr>
+            <a:spLocks noGrp="1"/>
+          </p:cNvSpPr>
+          <p:nvPr>
+            <p:ph idx="1"/>
+          </p:nvPr>
+        </p:nvSpPr>
+        <p:spPr/>
+        <p:txBody>
+          <a:bodyPr/>
+          <a:lstStyle/>
+          <a:p>
+            <a:endParaRPr lang="en-US"/>
+          </a:p>
+        </p:txBody>
+      </p:sp>
+    </p:spTree>
+    <p:extLst>
+      <p:ext uri="{BB962C8B-B14F-4D97-AF65-F5344CB8AC3E}">
+        <p14:creationId xmlns:p14="http://schemas.microsoft.com/office/powerpoint/2010/main" val="3172091669"/>
+      </p:ext>
+    </p:extLst>
+  </p:cSld>
+  <p:clrMapOvr>
+    <a:masterClrMapping/>
+  </p:clrMapOvr>
+</p:sld>
+</file>
+
+<file path=ppt/slides/slide27.xml><?xml version="1.0" encoding="utf-8"?>
+<p:sld xmlns:a="http://schemas.openxmlformats.org/drawingml/2006/main" xmlns:r="http://schemas.openxmlformats.org/officeDocument/2006/relationships" xmlns:p="http://schemas.openxmlformats.org/presentationml/2006/main">
+  <p:cSld>
+    <p:spTree>
+      <p:nvGrpSpPr>
+        <p:cNvPr id="1" name=""/>
+        <p:cNvGrpSpPr/>
+        <p:nvPr/>
+      </p:nvGrpSpPr>
+      <p:grpSpPr>
+        <a:xfrm>
+          <a:off x="0" y="0"/>
+          <a:ext cx="0" cy="0"/>
+          <a:chOff x="0" y="0"/>
+          <a:chExt cx="0" cy="0"/>
+        </a:xfrm>
+      </p:grpSpPr>
+      <p:sp>
+        <p:nvSpPr>
+          <p:cNvPr id="2" name="Title 1">
+            <a:extLst>
+              <a:ext uri="{FF2B5EF4-FFF2-40B4-BE49-F238E27FC236}">
+                <a16:creationId xmlns:a16="http://schemas.microsoft.com/office/drawing/2014/main" id="{0C1E1419-D755-4EE5-A721-4D53D835F5D1}"/>
+              </a:ext>
+            </a:extLst>
+          </p:cNvPr>
+          <p:cNvSpPr>
+            <a:spLocks noGrp="1"/>
+          </p:cNvSpPr>
+          <p:nvPr>
+            <p:ph type="ctrTitle"/>
+          </p:nvPr>
+        </p:nvSpPr>
+        <p:spPr/>
+        <p:txBody>
+          <a:bodyPr/>
+          <a:lstStyle/>
+          <a:p>
+            <a:r>
+              <a:rPr lang="en-US" b="1" dirty="0">
+                <a:latin typeface="+mn-lt"/>
+              </a:rPr>
+              <a:t>PATH 7a</a:t>
+            </a:r>
+          </a:p>
+        </p:txBody>
+      </p:sp>
+      <p:sp>
+        <p:nvSpPr>
+          <p:cNvPr id="3" name="Subtitle 2">
+            <a:extLst>
+              <a:ext uri="{FF2B5EF4-FFF2-40B4-BE49-F238E27FC236}">
+                <a16:creationId xmlns:a16="http://schemas.microsoft.com/office/drawing/2014/main" id="{B0AC6204-0C0A-4559-BC12-21BAB2CE2413}"/>
+              </a:ext>
+            </a:extLst>
+          </p:cNvPr>
+          <p:cNvSpPr>
+            <a:spLocks noGrp="1"/>
+          </p:cNvSpPr>
+          <p:nvPr>
+            <p:ph type="subTitle" idx="1"/>
+          </p:nvPr>
+        </p:nvSpPr>
+        <p:spPr/>
+        <p:txBody>
+          <a:bodyPr>
+            <a:normAutofit/>
+          </a:bodyPr>
+          <a:lstStyle/>
+          <a:p>
+            <a:r>
+              <a:rPr lang="en-US" sz="7200" dirty="0"/>
+              <a:t>3-1-4</a:t>
+            </a:r>
+          </a:p>
+        </p:txBody>
+      </p:sp>
+    </p:spTree>
+    <p:extLst>
+      <p:ext uri="{BB962C8B-B14F-4D97-AF65-F5344CB8AC3E}">
+        <p14:creationId xmlns:p14="http://schemas.microsoft.com/office/powerpoint/2010/main" val="2151913948"/>
+      </p:ext>
+    </p:extLst>
+  </p:cSld>
+  <p:clrMapOvr>
+    <a:masterClrMapping/>
+  </p:clrMapOvr>
+</p:sld>
+</file>
+
+<file path=ppt/slides/slide28.xml><?xml version="1.0" encoding="utf-8"?>
+<p:sld xmlns:a="http://schemas.openxmlformats.org/drawingml/2006/main" xmlns:r="http://schemas.openxmlformats.org/officeDocument/2006/relationships" xmlns:p="http://schemas.openxmlformats.org/presentationml/2006/main">
+  <p:cSld>
+    <p:spTree>
+      <p:nvGrpSpPr>
+        <p:cNvPr id="1" name=""/>
+        <p:cNvGrpSpPr/>
+        <p:nvPr/>
+      </p:nvGrpSpPr>
+      <p:grpSpPr>
+        <a:xfrm>
+          <a:off x="0" y="0"/>
+          <a:ext cx="0" cy="0"/>
+          <a:chOff x="0" y="0"/>
+          <a:chExt cx="0" cy="0"/>
+        </a:xfrm>
+      </p:grpSpPr>
+      <p:sp>
+        <p:nvSpPr>
+          <p:cNvPr id="2" name="Title 1">
+            <a:extLst>
+              <a:ext uri="{FF2B5EF4-FFF2-40B4-BE49-F238E27FC236}">
+                <a16:creationId xmlns:a16="http://schemas.microsoft.com/office/drawing/2014/main" id="{0C1E1419-D755-4EE5-A721-4D53D835F5D1}"/>
+              </a:ext>
+            </a:extLst>
+          </p:cNvPr>
+          <p:cNvSpPr>
+            <a:spLocks noGrp="1"/>
+          </p:cNvSpPr>
+          <p:nvPr>
+            <p:ph type="ctrTitle"/>
+          </p:nvPr>
+        </p:nvSpPr>
+        <p:spPr/>
+        <p:txBody>
+          <a:bodyPr/>
+          <a:lstStyle/>
+          <a:p>
+            <a:r>
+              <a:rPr lang="en-US" b="1" dirty="0">
+                <a:latin typeface="+mn-lt"/>
+              </a:rPr>
+              <a:t>PATH 7b</a:t>
+            </a:r>
+          </a:p>
+        </p:txBody>
+      </p:sp>
+      <p:sp>
+        <p:nvSpPr>
+          <p:cNvPr id="3" name="Subtitle 2">
+            <a:extLst>
+              <a:ext uri="{FF2B5EF4-FFF2-40B4-BE49-F238E27FC236}">
+                <a16:creationId xmlns:a16="http://schemas.microsoft.com/office/drawing/2014/main" id="{B0AC6204-0C0A-4559-BC12-21BAB2CE2413}"/>
+              </a:ext>
+            </a:extLst>
+          </p:cNvPr>
+          <p:cNvSpPr>
+            <a:spLocks noGrp="1"/>
+          </p:cNvSpPr>
+          <p:nvPr>
+            <p:ph type="subTitle" idx="1"/>
+          </p:nvPr>
+        </p:nvSpPr>
+        <p:spPr/>
+        <p:txBody>
+          <a:bodyPr>
+            <a:normAutofit/>
+          </a:bodyPr>
+          <a:lstStyle/>
+          <a:p>
+            <a:r>
+              <a:rPr lang="en-US" sz="7200" dirty="0"/>
+              <a:t>3-1-4</a:t>
+            </a:r>
+          </a:p>
+        </p:txBody>
+      </p:sp>
+    </p:spTree>
+    <p:extLst>
+      <p:ext uri="{BB962C8B-B14F-4D97-AF65-F5344CB8AC3E}">
+        <p14:creationId xmlns:p14="http://schemas.microsoft.com/office/powerpoint/2010/main" val="1717329910"/>
+      </p:ext>
+    </p:extLst>
+  </p:cSld>
+  <p:clrMapOvr>
+    <a:masterClrMapping/>
+  </p:clrMapOvr>
+</p:sld>
+</file>
+
+<file path=ppt/slides/slide29.xml><?xml version="1.0" encoding="utf-8"?>
+<p:sld xmlns:a="http://schemas.openxmlformats.org/drawingml/2006/main" xmlns:r="http://schemas.openxmlformats.org/officeDocument/2006/relationships" xmlns:p="http://schemas.openxmlformats.org/presentationml/2006/main">
+  <p:cSld>
+    <p:spTree>
+      <p:nvGrpSpPr>
+        <p:cNvPr id="1" name=""/>
+        <p:cNvGrpSpPr/>
+        <p:nvPr/>
+      </p:nvGrpSpPr>
+      <p:grpSpPr>
+        <a:xfrm>
+          <a:off x="0" y="0"/>
+          <a:ext cx="0" cy="0"/>
+          <a:chOff x="0" y="0"/>
+          <a:chExt cx="0" cy="0"/>
+        </a:xfrm>
+      </p:grpSpPr>
+      <p:sp>
+        <p:nvSpPr>
+          <p:cNvPr id="2" name="Title 1">
+            <a:extLst>
+              <a:ext uri="{FF2B5EF4-FFF2-40B4-BE49-F238E27FC236}">
+                <a16:creationId xmlns:a16="http://schemas.microsoft.com/office/drawing/2014/main" id="{0C1E1419-D755-4EE5-A721-4D53D835F5D1}"/>
+              </a:ext>
+            </a:extLst>
+          </p:cNvPr>
+          <p:cNvSpPr>
+            <a:spLocks noGrp="1"/>
+          </p:cNvSpPr>
+          <p:nvPr>
+            <p:ph type="ctrTitle"/>
+          </p:nvPr>
+        </p:nvSpPr>
+        <p:spPr/>
+        <p:txBody>
+          <a:bodyPr/>
+          <a:lstStyle/>
+          <a:p>
+            <a:r>
+              <a:rPr lang="en-US" b="1" dirty="0">
+                <a:latin typeface="+mn-lt"/>
+              </a:rPr>
+              <a:t>PATH 7c</a:t>
+            </a:r>
+          </a:p>
+        </p:txBody>
+      </p:sp>
+      <p:sp>
+        <p:nvSpPr>
+          <p:cNvPr id="3" name="Subtitle 2">
+            <a:extLst>
+              <a:ext uri="{FF2B5EF4-FFF2-40B4-BE49-F238E27FC236}">
+                <a16:creationId xmlns:a16="http://schemas.microsoft.com/office/drawing/2014/main" id="{B0AC6204-0C0A-4559-BC12-21BAB2CE2413}"/>
+              </a:ext>
+            </a:extLst>
+          </p:cNvPr>
+          <p:cNvSpPr>
+            <a:spLocks noGrp="1"/>
+          </p:cNvSpPr>
+          <p:nvPr>
+            <p:ph type="subTitle" idx="1"/>
+          </p:nvPr>
+        </p:nvSpPr>
+        <p:spPr/>
+        <p:txBody>
+          <a:bodyPr>
+            <a:normAutofit/>
+          </a:bodyPr>
+          <a:lstStyle/>
+          <a:p>
+            <a:r>
+              <a:rPr lang="en-US" sz="7200" dirty="0"/>
+              <a:t>3-1-4</a:t>
+            </a:r>
+          </a:p>
+        </p:txBody>
+      </p:sp>
+    </p:spTree>
+    <p:extLst>
+      <p:ext uri="{BB962C8B-B14F-4D97-AF65-F5344CB8AC3E}">
+        <p14:creationId xmlns:p14="http://schemas.microsoft.com/office/powerpoint/2010/main" val="495267579"/>
       </p:ext>
     </p:extLst>
   </p:cSld>
@@ -3577,6 +5425,913 @@
 </p:sld>
 </file>
 
+<file path=ppt/slides/slide30.xml><?xml version="1.0" encoding="utf-8"?>
+<p:sld xmlns:a="http://schemas.openxmlformats.org/drawingml/2006/main" xmlns:r="http://schemas.openxmlformats.org/officeDocument/2006/relationships" xmlns:p="http://schemas.openxmlformats.org/presentationml/2006/main">
+  <p:cSld>
+    <p:spTree>
+      <p:nvGrpSpPr>
+        <p:cNvPr id="1" name=""/>
+        <p:cNvGrpSpPr/>
+        <p:nvPr/>
+      </p:nvGrpSpPr>
+      <p:grpSpPr>
+        <a:xfrm>
+          <a:off x="0" y="0"/>
+          <a:ext cx="0" cy="0"/>
+          <a:chOff x="0" y="0"/>
+          <a:chExt cx="0" cy="0"/>
+        </a:xfrm>
+      </p:grpSpPr>
+      <p:sp>
+        <p:nvSpPr>
+          <p:cNvPr id="2" name="Title 1">
+            <a:extLst>
+              <a:ext uri="{FF2B5EF4-FFF2-40B4-BE49-F238E27FC236}">
+                <a16:creationId xmlns:a16="http://schemas.microsoft.com/office/drawing/2014/main" id="{0C1E1419-D755-4EE5-A721-4D53D835F5D1}"/>
+              </a:ext>
+            </a:extLst>
+          </p:cNvPr>
+          <p:cNvSpPr>
+            <a:spLocks noGrp="1"/>
+          </p:cNvSpPr>
+          <p:nvPr>
+            <p:ph type="ctrTitle"/>
+          </p:nvPr>
+        </p:nvSpPr>
+        <p:spPr/>
+        <p:txBody>
+          <a:bodyPr/>
+          <a:lstStyle/>
+          <a:p>
+            <a:r>
+              <a:rPr lang="en-US" b="1" dirty="0">
+                <a:latin typeface="+mn-lt"/>
+              </a:rPr>
+              <a:t>PATH 7d</a:t>
+            </a:r>
+          </a:p>
+        </p:txBody>
+      </p:sp>
+      <p:sp>
+        <p:nvSpPr>
+          <p:cNvPr id="3" name="Subtitle 2">
+            <a:extLst>
+              <a:ext uri="{FF2B5EF4-FFF2-40B4-BE49-F238E27FC236}">
+                <a16:creationId xmlns:a16="http://schemas.microsoft.com/office/drawing/2014/main" id="{B0AC6204-0C0A-4559-BC12-21BAB2CE2413}"/>
+              </a:ext>
+            </a:extLst>
+          </p:cNvPr>
+          <p:cNvSpPr>
+            <a:spLocks noGrp="1"/>
+          </p:cNvSpPr>
+          <p:nvPr>
+            <p:ph type="subTitle" idx="1"/>
+          </p:nvPr>
+        </p:nvSpPr>
+        <p:spPr/>
+        <p:txBody>
+          <a:bodyPr>
+            <a:normAutofit/>
+          </a:bodyPr>
+          <a:lstStyle/>
+          <a:p>
+            <a:r>
+              <a:rPr lang="en-US" sz="7200" dirty="0"/>
+              <a:t>3-1-4</a:t>
+            </a:r>
+          </a:p>
+          <a:p>
+            <a:endParaRPr lang="en-US" sz="7200" dirty="0"/>
+          </a:p>
+        </p:txBody>
+      </p:sp>
+    </p:spTree>
+    <p:extLst>
+      <p:ext uri="{BB962C8B-B14F-4D97-AF65-F5344CB8AC3E}">
+        <p14:creationId xmlns:p14="http://schemas.microsoft.com/office/powerpoint/2010/main" val="3978400005"/>
+      </p:ext>
+    </p:extLst>
+  </p:cSld>
+  <p:clrMapOvr>
+    <a:masterClrMapping/>
+  </p:clrMapOvr>
+</p:sld>
+</file>
+
+<file path=ppt/slides/slide31.xml><?xml version="1.0" encoding="utf-8"?>
+<p:sld xmlns:a="http://schemas.openxmlformats.org/drawingml/2006/main" xmlns:r="http://schemas.openxmlformats.org/officeDocument/2006/relationships" xmlns:p="http://schemas.openxmlformats.org/presentationml/2006/main">
+  <p:cSld>
+    <p:spTree>
+      <p:nvGrpSpPr>
+        <p:cNvPr id="1" name=""/>
+        <p:cNvGrpSpPr/>
+        <p:nvPr/>
+      </p:nvGrpSpPr>
+      <p:grpSpPr>
+        <a:xfrm>
+          <a:off x="0" y="0"/>
+          <a:ext cx="0" cy="0"/>
+          <a:chOff x="0" y="0"/>
+          <a:chExt cx="0" cy="0"/>
+        </a:xfrm>
+      </p:grpSpPr>
+      <p:sp>
+        <p:nvSpPr>
+          <p:cNvPr id="2" name="Title 1">
+            <a:extLst>
+              <a:ext uri="{FF2B5EF4-FFF2-40B4-BE49-F238E27FC236}">
+                <a16:creationId xmlns:a16="http://schemas.microsoft.com/office/drawing/2014/main" id="{0C1E1419-D755-4EE5-A721-4D53D835F5D1}"/>
+              </a:ext>
+            </a:extLst>
+          </p:cNvPr>
+          <p:cNvSpPr>
+            <a:spLocks noGrp="1"/>
+          </p:cNvSpPr>
+          <p:nvPr>
+            <p:ph type="ctrTitle"/>
+          </p:nvPr>
+        </p:nvSpPr>
+        <p:spPr/>
+        <p:txBody>
+          <a:bodyPr/>
+          <a:lstStyle/>
+          <a:p>
+            <a:r>
+              <a:rPr lang="en-US" b="1" dirty="0">
+                <a:latin typeface="+mn-lt"/>
+              </a:rPr>
+              <a:t>PATH 8a</a:t>
+            </a:r>
+          </a:p>
+        </p:txBody>
+      </p:sp>
+      <p:sp>
+        <p:nvSpPr>
+          <p:cNvPr id="3" name="Subtitle 2">
+            <a:extLst>
+              <a:ext uri="{FF2B5EF4-FFF2-40B4-BE49-F238E27FC236}">
+                <a16:creationId xmlns:a16="http://schemas.microsoft.com/office/drawing/2014/main" id="{B0AC6204-0C0A-4559-BC12-21BAB2CE2413}"/>
+              </a:ext>
+            </a:extLst>
+          </p:cNvPr>
+          <p:cNvSpPr>
+            <a:spLocks noGrp="1"/>
+          </p:cNvSpPr>
+          <p:nvPr>
+            <p:ph type="subTitle" idx="1"/>
+          </p:nvPr>
+        </p:nvSpPr>
+        <p:spPr/>
+        <p:txBody>
+          <a:bodyPr>
+            <a:normAutofit/>
+          </a:bodyPr>
+          <a:lstStyle/>
+          <a:p>
+            <a:r>
+              <a:rPr lang="en-US" sz="7200" dirty="0"/>
+              <a:t>3-2-4</a:t>
+            </a:r>
+          </a:p>
+        </p:txBody>
+      </p:sp>
+    </p:spTree>
+    <p:extLst>
+      <p:ext uri="{BB962C8B-B14F-4D97-AF65-F5344CB8AC3E}">
+        <p14:creationId xmlns:p14="http://schemas.microsoft.com/office/powerpoint/2010/main" val="799994449"/>
+      </p:ext>
+    </p:extLst>
+  </p:cSld>
+  <p:clrMapOvr>
+    <a:masterClrMapping/>
+  </p:clrMapOvr>
+</p:sld>
+</file>
+
+<file path=ppt/slides/slide32.xml><?xml version="1.0" encoding="utf-8"?>
+<p:sld xmlns:a="http://schemas.openxmlformats.org/drawingml/2006/main" xmlns:r="http://schemas.openxmlformats.org/officeDocument/2006/relationships" xmlns:p="http://schemas.openxmlformats.org/presentationml/2006/main">
+  <p:cSld>
+    <p:spTree>
+      <p:nvGrpSpPr>
+        <p:cNvPr id="1" name=""/>
+        <p:cNvGrpSpPr/>
+        <p:nvPr/>
+      </p:nvGrpSpPr>
+      <p:grpSpPr>
+        <a:xfrm>
+          <a:off x="0" y="0"/>
+          <a:ext cx="0" cy="0"/>
+          <a:chOff x="0" y="0"/>
+          <a:chExt cx="0" cy="0"/>
+        </a:xfrm>
+      </p:grpSpPr>
+      <p:sp>
+        <p:nvSpPr>
+          <p:cNvPr id="2" name="Title 1">
+            <a:extLst>
+              <a:ext uri="{FF2B5EF4-FFF2-40B4-BE49-F238E27FC236}">
+                <a16:creationId xmlns:a16="http://schemas.microsoft.com/office/drawing/2014/main" id="{0C1E1419-D755-4EE5-A721-4D53D835F5D1}"/>
+              </a:ext>
+            </a:extLst>
+          </p:cNvPr>
+          <p:cNvSpPr>
+            <a:spLocks noGrp="1"/>
+          </p:cNvSpPr>
+          <p:nvPr>
+            <p:ph type="ctrTitle"/>
+          </p:nvPr>
+        </p:nvSpPr>
+        <p:spPr/>
+        <p:txBody>
+          <a:bodyPr/>
+          <a:lstStyle/>
+          <a:p>
+            <a:r>
+              <a:rPr lang="en-US" b="1" dirty="0">
+                <a:latin typeface="+mn-lt"/>
+              </a:rPr>
+              <a:t>PATH 8b</a:t>
+            </a:r>
+          </a:p>
+        </p:txBody>
+      </p:sp>
+      <p:sp>
+        <p:nvSpPr>
+          <p:cNvPr id="3" name="Subtitle 2">
+            <a:extLst>
+              <a:ext uri="{FF2B5EF4-FFF2-40B4-BE49-F238E27FC236}">
+                <a16:creationId xmlns:a16="http://schemas.microsoft.com/office/drawing/2014/main" id="{B0AC6204-0C0A-4559-BC12-21BAB2CE2413}"/>
+              </a:ext>
+            </a:extLst>
+          </p:cNvPr>
+          <p:cNvSpPr>
+            <a:spLocks noGrp="1"/>
+          </p:cNvSpPr>
+          <p:nvPr>
+            <p:ph type="subTitle" idx="1"/>
+          </p:nvPr>
+        </p:nvSpPr>
+        <p:spPr/>
+        <p:txBody>
+          <a:bodyPr>
+            <a:normAutofit/>
+          </a:bodyPr>
+          <a:lstStyle/>
+          <a:p>
+            <a:r>
+              <a:rPr lang="en-US" sz="7200" dirty="0"/>
+              <a:t>3-2-4</a:t>
+            </a:r>
+          </a:p>
+        </p:txBody>
+      </p:sp>
+    </p:spTree>
+    <p:extLst>
+      <p:ext uri="{BB962C8B-B14F-4D97-AF65-F5344CB8AC3E}">
+        <p14:creationId xmlns:p14="http://schemas.microsoft.com/office/powerpoint/2010/main" val="2428802166"/>
+      </p:ext>
+    </p:extLst>
+  </p:cSld>
+  <p:clrMapOvr>
+    <a:masterClrMapping/>
+  </p:clrMapOvr>
+</p:sld>
+</file>
+
+<file path=ppt/slides/slide33.xml><?xml version="1.0" encoding="utf-8"?>
+<p:sld xmlns:a="http://schemas.openxmlformats.org/drawingml/2006/main" xmlns:r="http://schemas.openxmlformats.org/officeDocument/2006/relationships" xmlns:p="http://schemas.openxmlformats.org/presentationml/2006/main">
+  <p:cSld>
+    <p:spTree>
+      <p:nvGrpSpPr>
+        <p:cNvPr id="1" name=""/>
+        <p:cNvGrpSpPr/>
+        <p:nvPr/>
+      </p:nvGrpSpPr>
+      <p:grpSpPr>
+        <a:xfrm>
+          <a:off x="0" y="0"/>
+          <a:ext cx="0" cy="0"/>
+          <a:chOff x="0" y="0"/>
+          <a:chExt cx="0" cy="0"/>
+        </a:xfrm>
+      </p:grpSpPr>
+      <p:sp>
+        <p:nvSpPr>
+          <p:cNvPr id="2" name="Title 1">
+            <a:extLst>
+              <a:ext uri="{FF2B5EF4-FFF2-40B4-BE49-F238E27FC236}">
+                <a16:creationId xmlns:a16="http://schemas.microsoft.com/office/drawing/2014/main" id="{0C1E1419-D755-4EE5-A721-4D53D835F5D1}"/>
+              </a:ext>
+            </a:extLst>
+          </p:cNvPr>
+          <p:cNvSpPr>
+            <a:spLocks noGrp="1"/>
+          </p:cNvSpPr>
+          <p:nvPr>
+            <p:ph type="ctrTitle"/>
+          </p:nvPr>
+        </p:nvSpPr>
+        <p:spPr/>
+        <p:txBody>
+          <a:bodyPr/>
+          <a:lstStyle/>
+          <a:p>
+            <a:r>
+              <a:rPr lang="en-US" b="1" dirty="0">
+                <a:latin typeface="+mn-lt"/>
+              </a:rPr>
+              <a:t>PATH 8c</a:t>
+            </a:r>
+          </a:p>
+        </p:txBody>
+      </p:sp>
+      <p:sp>
+        <p:nvSpPr>
+          <p:cNvPr id="3" name="Subtitle 2">
+            <a:extLst>
+              <a:ext uri="{FF2B5EF4-FFF2-40B4-BE49-F238E27FC236}">
+                <a16:creationId xmlns:a16="http://schemas.microsoft.com/office/drawing/2014/main" id="{B0AC6204-0C0A-4559-BC12-21BAB2CE2413}"/>
+              </a:ext>
+            </a:extLst>
+          </p:cNvPr>
+          <p:cNvSpPr>
+            <a:spLocks noGrp="1"/>
+          </p:cNvSpPr>
+          <p:nvPr>
+            <p:ph type="subTitle" idx="1"/>
+          </p:nvPr>
+        </p:nvSpPr>
+        <p:spPr/>
+        <p:txBody>
+          <a:bodyPr>
+            <a:normAutofit/>
+          </a:bodyPr>
+          <a:lstStyle/>
+          <a:p>
+            <a:r>
+              <a:rPr lang="en-US" sz="7200" dirty="0"/>
+              <a:t>3-2-4</a:t>
+            </a:r>
+          </a:p>
+        </p:txBody>
+      </p:sp>
+    </p:spTree>
+    <p:extLst>
+      <p:ext uri="{BB962C8B-B14F-4D97-AF65-F5344CB8AC3E}">
+        <p14:creationId xmlns:p14="http://schemas.microsoft.com/office/powerpoint/2010/main" val="369532784"/>
+      </p:ext>
+    </p:extLst>
+  </p:cSld>
+  <p:clrMapOvr>
+    <a:masterClrMapping/>
+  </p:clrMapOvr>
+</p:sld>
+</file>
+
+<file path=ppt/slides/slide34.xml><?xml version="1.0" encoding="utf-8"?>
+<p:sld xmlns:a="http://schemas.openxmlformats.org/drawingml/2006/main" xmlns:r="http://schemas.openxmlformats.org/officeDocument/2006/relationships" xmlns:p="http://schemas.openxmlformats.org/presentationml/2006/main">
+  <p:cSld>
+    <p:spTree>
+      <p:nvGrpSpPr>
+        <p:cNvPr id="1" name=""/>
+        <p:cNvGrpSpPr/>
+        <p:nvPr/>
+      </p:nvGrpSpPr>
+      <p:grpSpPr>
+        <a:xfrm>
+          <a:off x="0" y="0"/>
+          <a:ext cx="0" cy="0"/>
+          <a:chOff x="0" y="0"/>
+          <a:chExt cx="0" cy="0"/>
+        </a:xfrm>
+      </p:grpSpPr>
+      <p:sp>
+        <p:nvSpPr>
+          <p:cNvPr id="2" name="Title 1">
+            <a:extLst>
+              <a:ext uri="{FF2B5EF4-FFF2-40B4-BE49-F238E27FC236}">
+                <a16:creationId xmlns:a16="http://schemas.microsoft.com/office/drawing/2014/main" id="{0C1E1419-D755-4EE5-A721-4D53D835F5D1}"/>
+              </a:ext>
+            </a:extLst>
+          </p:cNvPr>
+          <p:cNvSpPr>
+            <a:spLocks noGrp="1"/>
+          </p:cNvSpPr>
+          <p:nvPr>
+            <p:ph type="ctrTitle"/>
+          </p:nvPr>
+        </p:nvSpPr>
+        <p:spPr/>
+        <p:txBody>
+          <a:bodyPr/>
+          <a:lstStyle/>
+          <a:p>
+            <a:r>
+              <a:rPr lang="en-US" b="1" dirty="0">
+                <a:latin typeface="+mn-lt"/>
+              </a:rPr>
+              <a:t>PATH 8d</a:t>
+            </a:r>
+          </a:p>
+        </p:txBody>
+      </p:sp>
+      <p:sp>
+        <p:nvSpPr>
+          <p:cNvPr id="3" name="Subtitle 2">
+            <a:extLst>
+              <a:ext uri="{FF2B5EF4-FFF2-40B4-BE49-F238E27FC236}">
+                <a16:creationId xmlns:a16="http://schemas.microsoft.com/office/drawing/2014/main" id="{B0AC6204-0C0A-4559-BC12-21BAB2CE2413}"/>
+              </a:ext>
+            </a:extLst>
+          </p:cNvPr>
+          <p:cNvSpPr>
+            <a:spLocks noGrp="1"/>
+          </p:cNvSpPr>
+          <p:nvPr>
+            <p:ph type="subTitle" idx="1"/>
+          </p:nvPr>
+        </p:nvSpPr>
+        <p:spPr/>
+        <p:txBody>
+          <a:bodyPr>
+            <a:normAutofit/>
+          </a:bodyPr>
+          <a:lstStyle/>
+          <a:p>
+            <a:r>
+              <a:rPr lang="en-US" sz="7200" dirty="0"/>
+              <a:t>3-2-4</a:t>
+            </a:r>
+          </a:p>
+        </p:txBody>
+      </p:sp>
+    </p:spTree>
+    <p:extLst>
+      <p:ext uri="{BB962C8B-B14F-4D97-AF65-F5344CB8AC3E}">
+        <p14:creationId xmlns:p14="http://schemas.microsoft.com/office/powerpoint/2010/main" val="1632976474"/>
+      </p:ext>
+    </p:extLst>
+  </p:cSld>
+  <p:clrMapOvr>
+    <a:masterClrMapping/>
+  </p:clrMapOvr>
+</p:sld>
+</file>
+
+<file path=ppt/slides/slide35.xml><?xml version="1.0" encoding="utf-8"?>
+<p:sld xmlns:a="http://schemas.openxmlformats.org/drawingml/2006/main" xmlns:r="http://schemas.openxmlformats.org/officeDocument/2006/relationships" xmlns:p="http://schemas.openxmlformats.org/presentationml/2006/main">
+  <p:cSld>
+    <p:spTree>
+      <p:nvGrpSpPr>
+        <p:cNvPr id="1" name=""/>
+        <p:cNvGrpSpPr/>
+        <p:nvPr/>
+      </p:nvGrpSpPr>
+      <p:grpSpPr>
+        <a:xfrm>
+          <a:off x="0" y="0"/>
+          <a:ext cx="0" cy="0"/>
+          <a:chOff x="0" y="0"/>
+          <a:chExt cx="0" cy="0"/>
+        </a:xfrm>
+      </p:grpSpPr>
+      <p:sp>
+        <p:nvSpPr>
+          <p:cNvPr id="2" name="Title 1">
+            <a:extLst>
+              <a:ext uri="{FF2B5EF4-FFF2-40B4-BE49-F238E27FC236}">
+                <a16:creationId xmlns:a16="http://schemas.microsoft.com/office/drawing/2014/main" id="{0C1E1419-D755-4EE5-A721-4D53D835F5D1}"/>
+              </a:ext>
+            </a:extLst>
+          </p:cNvPr>
+          <p:cNvSpPr>
+            <a:spLocks noGrp="1"/>
+          </p:cNvSpPr>
+          <p:nvPr>
+            <p:ph type="ctrTitle"/>
+          </p:nvPr>
+        </p:nvSpPr>
+        <p:spPr/>
+        <p:txBody>
+          <a:bodyPr/>
+          <a:lstStyle/>
+          <a:p>
+            <a:r>
+              <a:rPr lang="en-US" b="1" dirty="0">
+                <a:latin typeface="+mn-lt"/>
+              </a:rPr>
+              <a:t>PATH 9a</a:t>
+            </a:r>
+          </a:p>
+        </p:txBody>
+      </p:sp>
+      <p:sp>
+        <p:nvSpPr>
+          <p:cNvPr id="3" name="Subtitle 2">
+            <a:extLst>
+              <a:ext uri="{FF2B5EF4-FFF2-40B4-BE49-F238E27FC236}">
+                <a16:creationId xmlns:a16="http://schemas.microsoft.com/office/drawing/2014/main" id="{B0AC6204-0C0A-4559-BC12-21BAB2CE2413}"/>
+              </a:ext>
+            </a:extLst>
+          </p:cNvPr>
+          <p:cNvSpPr>
+            <a:spLocks noGrp="1"/>
+          </p:cNvSpPr>
+          <p:nvPr>
+            <p:ph type="subTitle" idx="1"/>
+          </p:nvPr>
+        </p:nvSpPr>
+        <p:spPr/>
+        <p:txBody>
+          <a:bodyPr>
+            <a:normAutofit/>
+          </a:bodyPr>
+          <a:lstStyle/>
+          <a:p>
+            <a:r>
+              <a:rPr lang="en-US" sz="7200" dirty="0"/>
+              <a:t>3-3-4</a:t>
+            </a:r>
+          </a:p>
+        </p:txBody>
+      </p:sp>
+    </p:spTree>
+    <p:extLst>
+      <p:ext uri="{BB962C8B-B14F-4D97-AF65-F5344CB8AC3E}">
+        <p14:creationId xmlns:p14="http://schemas.microsoft.com/office/powerpoint/2010/main" val="924819670"/>
+      </p:ext>
+    </p:extLst>
+  </p:cSld>
+  <p:clrMapOvr>
+    <a:masterClrMapping/>
+  </p:clrMapOvr>
+</p:sld>
+</file>
+
+<file path=ppt/slides/slide36.xml><?xml version="1.0" encoding="utf-8"?>
+<p:sld xmlns:a="http://schemas.openxmlformats.org/drawingml/2006/main" xmlns:r="http://schemas.openxmlformats.org/officeDocument/2006/relationships" xmlns:p="http://schemas.openxmlformats.org/presentationml/2006/main">
+  <p:cSld>
+    <p:spTree>
+      <p:nvGrpSpPr>
+        <p:cNvPr id="1" name=""/>
+        <p:cNvGrpSpPr/>
+        <p:nvPr/>
+      </p:nvGrpSpPr>
+      <p:grpSpPr>
+        <a:xfrm>
+          <a:off x="0" y="0"/>
+          <a:ext cx="0" cy="0"/>
+          <a:chOff x="0" y="0"/>
+          <a:chExt cx="0" cy="0"/>
+        </a:xfrm>
+      </p:grpSpPr>
+      <p:sp>
+        <p:nvSpPr>
+          <p:cNvPr id="2" name="Title 1">
+            <a:extLst>
+              <a:ext uri="{FF2B5EF4-FFF2-40B4-BE49-F238E27FC236}">
+                <a16:creationId xmlns:a16="http://schemas.microsoft.com/office/drawing/2014/main" id="{0C1E1419-D755-4EE5-A721-4D53D835F5D1}"/>
+              </a:ext>
+            </a:extLst>
+          </p:cNvPr>
+          <p:cNvSpPr>
+            <a:spLocks noGrp="1"/>
+          </p:cNvSpPr>
+          <p:nvPr>
+            <p:ph type="ctrTitle"/>
+          </p:nvPr>
+        </p:nvSpPr>
+        <p:spPr/>
+        <p:txBody>
+          <a:bodyPr/>
+          <a:lstStyle/>
+          <a:p>
+            <a:r>
+              <a:rPr lang="en-US" b="1" dirty="0">
+                <a:latin typeface="+mn-lt"/>
+              </a:rPr>
+              <a:t>PATH 9b</a:t>
+            </a:r>
+          </a:p>
+        </p:txBody>
+      </p:sp>
+      <p:sp>
+        <p:nvSpPr>
+          <p:cNvPr id="3" name="Subtitle 2">
+            <a:extLst>
+              <a:ext uri="{FF2B5EF4-FFF2-40B4-BE49-F238E27FC236}">
+                <a16:creationId xmlns:a16="http://schemas.microsoft.com/office/drawing/2014/main" id="{B0AC6204-0C0A-4559-BC12-21BAB2CE2413}"/>
+              </a:ext>
+            </a:extLst>
+          </p:cNvPr>
+          <p:cNvSpPr>
+            <a:spLocks noGrp="1"/>
+          </p:cNvSpPr>
+          <p:nvPr>
+            <p:ph type="subTitle" idx="1"/>
+          </p:nvPr>
+        </p:nvSpPr>
+        <p:spPr/>
+        <p:txBody>
+          <a:bodyPr>
+            <a:normAutofit/>
+          </a:bodyPr>
+          <a:lstStyle/>
+          <a:p>
+            <a:r>
+              <a:rPr lang="en-US" sz="7200" dirty="0"/>
+              <a:t>3-3-4</a:t>
+            </a:r>
+          </a:p>
+        </p:txBody>
+      </p:sp>
+    </p:spTree>
+    <p:extLst>
+      <p:ext uri="{BB962C8B-B14F-4D97-AF65-F5344CB8AC3E}">
+        <p14:creationId xmlns:p14="http://schemas.microsoft.com/office/powerpoint/2010/main" val="3847416827"/>
+      </p:ext>
+    </p:extLst>
+  </p:cSld>
+  <p:clrMapOvr>
+    <a:masterClrMapping/>
+  </p:clrMapOvr>
+</p:sld>
+</file>
+
+<file path=ppt/slides/slide37.xml><?xml version="1.0" encoding="utf-8"?>
+<p:sld xmlns:a="http://schemas.openxmlformats.org/drawingml/2006/main" xmlns:r="http://schemas.openxmlformats.org/officeDocument/2006/relationships" xmlns:p="http://schemas.openxmlformats.org/presentationml/2006/main">
+  <p:cSld>
+    <p:spTree>
+      <p:nvGrpSpPr>
+        <p:cNvPr id="1" name=""/>
+        <p:cNvGrpSpPr/>
+        <p:nvPr/>
+      </p:nvGrpSpPr>
+      <p:grpSpPr>
+        <a:xfrm>
+          <a:off x="0" y="0"/>
+          <a:ext cx="0" cy="0"/>
+          <a:chOff x="0" y="0"/>
+          <a:chExt cx="0" cy="0"/>
+        </a:xfrm>
+      </p:grpSpPr>
+      <p:sp>
+        <p:nvSpPr>
+          <p:cNvPr id="2" name="Title 1">
+            <a:extLst>
+              <a:ext uri="{FF2B5EF4-FFF2-40B4-BE49-F238E27FC236}">
+                <a16:creationId xmlns:a16="http://schemas.microsoft.com/office/drawing/2014/main" id="{0C1E1419-D755-4EE5-A721-4D53D835F5D1}"/>
+              </a:ext>
+            </a:extLst>
+          </p:cNvPr>
+          <p:cNvSpPr>
+            <a:spLocks noGrp="1"/>
+          </p:cNvSpPr>
+          <p:nvPr>
+            <p:ph type="ctrTitle"/>
+          </p:nvPr>
+        </p:nvSpPr>
+        <p:spPr/>
+        <p:txBody>
+          <a:bodyPr/>
+          <a:lstStyle/>
+          <a:p>
+            <a:r>
+              <a:rPr lang="en-US" b="1" dirty="0">
+                <a:latin typeface="+mn-lt"/>
+              </a:rPr>
+              <a:t>PATH 9c</a:t>
+            </a:r>
+          </a:p>
+        </p:txBody>
+      </p:sp>
+      <p:sp>
+        <p:nvSpPr>
+          <p:cNvPr id="3" name="Subtitle 2">
+            <a:extLst>
+              <a:ext uri="{FF2B5EF4-FFF2-40B4-BE49-F238E27FC236}">
+                <a16:creationId xmlns:a16="http://schemas.microsoft.com/office/drawing/2014/main" id="{B0AC6204-0C0A-4559-BC12-21BAB2CE2413}"/>
+              </a:ext>
+            </a:extLst>
+          </p:cNvPr>
+          <p:cNvSpPr>
+            <a:spLocks noGrp="1"/>
+          </p:cNvSpPr>
+          <p:nvPr>
+            <p:ph type="subTitle" idx="1"/>
+          </p:nvPr>
+        </p:nvSpPr>
+        <p:spPr/>
+        <p:txBody>
+          <a:bodyPr>
+            <a:normAutofit/>
+          </a:bodyPr>
+          <a:lstStyle/>
+          <a:p>
+            <a:r>
+              <a:rPr lang="en-US" sz="7200" dirty="0"/>
+              <a:t>3-3-4</a:t>
+            </a:r>
+          </a:p>
+          <a:p>
+            <a:endParaRPr lang="en-US" sz="7200" dirty="0"/>
+          </a:p>
+        </p:txBody>
+      </p:sp>
+    </p:spTree>
+    <p:extLst>
+      <p:ext uri="{BB962C8B-B14F-4D97-AF65-F5344CB8AC3E}">
+        <p14:creationId xmlns:p14="http://schemas.microsoft.com/office/powerpoint/2010/main" val="1490487607"/>
+      </p:ext>
+    </p:extLst>
+  </p:cSld>
+  <p:clrMapOvr>
+    <a:masterClrMapping/>
+  </p:clrMapOvr>
+</p:sld>
+</file>
+
+<file path=ppt/slides/slide38.xml><?xml version="1.0" encoding="utf-8"?>
+<p:sld xmlns:a="http://schemas.openxmlformats.org/drawingml/2006/main" xmlns:r="http://schemas.openxmlformats.org/officeDocument/2006/relationships" xmlns:p="http://schemas.openxmlformats.org/presentationml/2006/main">
+  <p:cSld>
+    <p:spTree>
+      <p:nvGrpSpPr>
+        <p:cNvPr id="1" name=""/>
+        <p:cNvGrpSpPr/>
+        <p:nvPr/>
+      </p:nvGrpSpPr>
+      <p:grpSpPr>
+        <a:xfrm>
+          <a:off x="0" y="0"/>
+          <a:ext cx="0" cy="0"/>
+          <a:chOff x="0" y="0"/>
+          <a:chExt cx="0" cy="0"/>
+        </a:xfrm>
+      </p:grpSpPr>
+      <p:sp>
+        <p:nvSpPr>
+          <p:cNvPr id="2" name="Title 1">
+            <a:extLst>
+              <a:ext uri="{FF2B5EF4-FFF2-40B4-BE49-F238E27FC236}">
+                <a16:creationId xmlns:a16="http://schemas.microsoft.com/office/drawing/2014/main" id="{0C1E1419-D755-4EE5-A721-4D53D835F5D1}"/>
+              </a:ext>
+            </a:extLst>
+          </p:cNvPr>
+          <p:cNvSpPr>
+            <a:spLocks noGrp="1"/>
+          </p:cNvSpPr>
+          <p:nvPr>
+            <p:ph type="ctrTitle"/>
+          </p:nvPr>
+        </p:nvSpPr>
+        <p:spPr/>
+        <p:txBody>
+          <a:bodyPr/>
+          <a:lstStyle/>
+          <a:p>
+            <a:r>
+              <a:rPr lang="en-US" b="1" dirty="0">
+                <a:latin typeface="+mn-lt"/>
+              </a:rPr>
+              <a:t>PATH 9d</a:t>
+            </a:r>
+          </a:p>
+        </p:txBody>
+      </p:sp>
+      <p:sp>
+        <p:nvSpPr>
+          <p:cNvPr id="3" name="Subtitle 2">
+            <a:extLst>
+              <a:ext uri="{FF2B5EF4-FFF2-40B4-BE49-F238E27FC236}">
+                <a16:creationId xmlns:a16="http://schemas.microsoft.com/office/drawing/2014/main" id="{B0AC6204-0C0A-4559-BC12-21BAB2CE2413}"/>
+              </a:ext>
+            </a:extLst>
+          </p:cNvPr>
+          <p:cNvSpPr>
+            <a:spLocks noGrp="1"/>
+          </p:cNvSpPr>
+          <p:nvPr>
+            <p:ph type="subTitle" idx="1"/>
+          </p:nvPr>
+        </p:nvSpPr>
+        <p:spPr/>
+        <p:txBody>
+          <a:bodyPr>
+            <a:normAutofit/>
+          </a:bodyPr>
+          <a:lstStyle/>
+          <a:p>
+            <a:r>
+              <a:rPr lang="en-US" sz="7200" dirty="0"/>
+              <a:t>3-3-4</a:t>
+            </a:r>
+          </a:p>
+          <a:p>
+            <a:endParaRPr lang="en-US" sz="7200" dirty="0"/>
+          </a:p>
+        </p:txBody>
+      </p:sp>
+    </p:spTree>
+    <p:extLst>
+      <p:ext uri="{BB962C8B-B14F-4D97-AF65-F5344CB8AC3E}">
+        <p14:creationId xmlns:p14="http://schemas.microsoft.com/office/powerpoint/2010/main" val="2769894601"/>
+      </p:ext>
+    </p:extLst>
+  </p:cSld>
+  <p:clrMapOvr>
+    <a:masterClrMapping/>
+  </p:clrMapOvr>
+</p:sld>
+</file>
+
+<file path=ppt/slides/slide39.xml><?xml version="1.0" encoding="utf-8"?>
+<p:sld xmlns:a="http://schemas.openxmlformats.org/drawingml/2006/main" xmlns:r="http://schemas.openxmlformats.org/officeDocument/2006/relationships" xmlns:p="http://schemas.openxmlformats.org/presentationml/2006/main">
+  <p:cSld>
+    <p:bg>
+      <p:bgPr>
+        <a:solidFill>
+          <a:schemeClr val="tx1"/>
+        </a:solidFill>
+        <a:effectLst/>
+      </p:bgPr>
+    </p:bg>
+    <p:spTree>
+      <p:nvGrpSpPr>
+        <p:cNvPr id="1" name=""/>
+        <p:cNvGrpSpPr/>
+        <p:nvPr/>
+      </p:nvGrpSpPr>
+      <p:grpSpPr>
+        <a:xfrm>
+          <a:off x="0" y="0"/>
+          <a:ext cx="0" cy="0"/>
+          <a:chOff x="0" y="0"/>
+          <a:chExt cx="0" cy="0"/>
+        </a:xfrm>
+      </p:grpSpPr>
+      <p:sp>
+        <p:nvSpPr>
+          <p:cNvPr id="2" name="Title 1">
+            <a:extLst>
+              <a:ext uri="{FF2B5EF4-FFF2-40B4-BE49-F238E27FC236}">
+                <a16:creationId xmlns:a16="http://schemas.microsoft.com/office/drawing/2014/main" id="{33C2851B-1FAA-42FF-9D4D-88CF13CC765A}"/>
+              </a:ext>
+            </a:extLst>
+          </p:cNvPr>
+          <p:cNvSpPr>
+            <a:spLocks noGrp="1"/>
+          </p:cNvSpPr>
+          <p:nvPr>
+            <p:ph type="title"/>
+          </p:nvPr>
+        </p:nvSpPr>
+        <p:spPr/>
+        <p:txBody>
+          <a:bodyPr/>
+          <a:lstStyle/>
+          <a:p>
+            <a:endParaRPr lang="en-US"/>
+          </a:p>
+        </p:txBody>
+      </p:sp>
+      <p:sp>
+        <p:nvSpPr>
+          <p:cNvPr id="3" name="Content Placeholder 2">
+            <a:extLst>
+              <a:ext uri="{FF2B5EF4-FFF2-40B4-BE49-F238E27FC236}">
+                <a16:creationId xmlns:a16="http://schemas.microsoft.com/office/drawing/2014/main" id="{D8C4BA4A-14A8-4D0C-B634-F36965863343}"/>
+              </a:ext>
+            </a:extLst>
+          </p:cNvPr>
+          <p:cNvSpPr>
+            <a:spLocks noGrp="1"/>
+          </p:cNvSpPr>
+          <p:nvPr>
+            <p:ph idx="1"/>
+          </p:nvPr>
+        </p:nvSpPr>
+        <p:spPr/>
+        <p:txBody>
+          <a:bodyPr/>
+          <a:lstStyle/>
+          <a:p>
+            <a:endParaRPr lang="en-US"/>
+          </a:p>
+        </p:txBody>
+      </p:sp>
+    </p:spTree>
+    <p:extLst>
+      <p:ext uri="{BB962C8B-B14F-4D97-AF65-F5344CB8AC3E}">
+        <p14:creationId xmlns:p14="http://schemas.microsoft.com/office/powerpoint/2010/main" val="1600397128"/>
+      </p:ext>
+    </p:extLst>
+  </p:cSld>
+  <p:clrMapOvr>
+    <a:masterClrMapping/>
+  </p:clrMapOvr>
+</p:sld>
+</file>
+
 <file path=ppt/slides/slide4.xml><?xml version="1.0" encoding="utf-8"?>
 <p:sld xmlns:a="http://schemas.openxmlformats.org/drawingml/2006/main" xmlns:r="http://schemas.openxmlformats.org/officeDocument/2006/relationships" xmlns:p="http://schemas.openxmlformats.org/presentationml/2006/main">
   <p:cSld>
@@ -3658,6 +6413,1548 @@
     <p:extLst>
       <p:ext uri="{BB962C8B-B14F-4D97-AF65-F5344CB8AC3E}">
         <p14:creationId xmlns:p14="http://schemas.microsoft.com/office/powerpoint/2010/main" val="3134347563"/>
+      </p:ext>
+    </p:extLst>
+  </p:cSld>
+  <p:clrMapOvr>
+    <a:masterClrMapping/>
+  </p:clrMapOvr>
+</p:sld>
+</file>
+
+<file path=ppt/slides/slide40.xml><?xml version="1.0" encoding="utf-8"?>
+<p:sld xmlns:a="http://schemas.openxmlformats.org/drawingml/2006/main" xmlns:r="http://schemas.openxmlformats.org/officeDocument/2006/relationships" xmlns:p="http://schemas.openxmlformats.org/presentationml/2006/main">
+  <p:cSld>
+    <p:spTree>
+      <p:nvGrpSpPr>
+        <p:cNvPr id="1" name=""/>
+        <p:cNvGrpSpPr/>
+        <p:nvPr/>
+      </p:nvGrpSpPr>
+      <p:grpSpPr>
+        <a:xfrm>
+          <a:off x="0" y="0"/>
+          <a:ext cx="0" cy="0"/>
+          <a:chOff x="0" y="0"/>
+          <a:chExt cx="0" cy="0"/>
+        </a:xfrm>
+      </p:grpSpPr>
+      <p:sp>
+        <p:nvSpPr>
+          <p:cNvPr id="2" name="Title 1">
+            <a:extLst>
+              <a:ext uri="{FF2B5EF4-FFF2-40B4-BE49-F238E27FC236}">
+                <a16:creationId xmlns:a16="http://schemas.microsoft.com/office/drawing/2014/main" id="{0C1E1419-D755-4EE5-A721-4D53D835F5D1}"/>
+              </a:ext>
+            </a:extLst>
+          </p:cNvPr>
+          <p:cNvSpPr>
+            <a:spLocks noGrp="1"/>
+          </p:cNvSpPr>
+          <p:nvPr>
+            <p:ph type="ctrTitle"/>
+          </p:nvPr>
+        </p:nvSpPr>
+        <p:spPr/>
+        <p:txBody>
+          <a:bodyPr/>
+          <a:lstStyle/>
+          <a:p>
+            <a:r>
+              <a:rPr lang="en-US" b="1" dirty="0">
+                <a:latin typeface="+mn-lt"/>
+              </a:rPr>
+              <a:t>PATH 10a</a:t>
+            </a:r>
+          </a:p>
+        </p:txBody>
+      </p:sp>
+      <p:sp>
+        <p:nvSpPr>
+          <p:cNvPr id="3" name="Subtitle 2">
+            <a:extLst>
+              <a:ext uri="{FF2B5EF4-FFF2-40B4-BE49-F238E27FC236}">
+                <a16:creationId xmlns:a16="http://schemas.microsoft.com/office/drawing/2014/main" id="{B0AC6204-0C0A-4559-BC12-21BAB2CE2413}"/>
+              </a:ext>
+            </a:extLst>
+          </p:cNvPr>
+          <p:cNvSpPr>
+            <a:spLocks noGrp="1"/>
+          </p:cNvSpPr>
+          <p:nvPr>
+            <p:ph type="subTitle" idx="1"/>
+          </p:nvPr>
+        </p:nvSpPr>
+        <p:spPr/>
+        <p:txBody>
+          <a:bodyPr>
+            <a:normAutofit/>
+          </a:bodyPr>
+          <a:lstStyle/>
+          <a:p>
+            <a:r>
+              <a:rPr lang="en-US" sz="7200" dirty="0"/>
+              <a:t>4-2-4</a:t>
+            </a:r>
+          </a:p>
+        </p:txBody>
+      </p:sp>
+    </p:spTree>
+    <p:extLst>
+      <p:ext uri="{BB962C8B-B14F-4D97-AF65-F5344CB8AC3E}">
+        <p14:creationId xmlns:p14="http://schemas.microsoft.com/office/powerpoint/2010/main" val="3427087985"/>
+      </p:ext>
+    </p:extLst>
+  </p:cSld>
+  <p:clrMapOvr>
+    <a:masterClrMapping/>
+  </p:clrMapOvr>
+</p:sld>
+</file>
+
+<file path=ppt/slides/slide41.xml><?xml version="1.0" encoding="utf-8"?>
+<p:sld xmlns:a="http://schemas.openxmlformats.org/drawingml/2006/main" xmlns:r="http://schemas.openxmlformats.org/officeDocument/2006/relationships" xmlns:p="http://schemas.openxmlformats.org/presentationml/2006/main">
+  <p:cSld>
+    <p:spTree>
+      <p:nvGrpSpPr>
+        <p:cNvPr id="1" name=""/>
+        <p:cNvGrpSpPr/>
+        <p:nvPr/>
+      </p:nvGrpSpPr>
+      <p:grpSpPr>
+        <a:xfrm>
+          <a:off x="0" y="0"/>
+          <a:ext cx="0" cy="0"/>
+          <a:chOff x="0" y="0"/>
+          <a:chExt cx="0" cy="0"/>
+        </a:xfrm>
+      </p:grpSpPr>
+      <p:sp>
+        <p:nvSpPr>
+          <p:cNvPr id="2" name="Title 1">
+            <a:extLst>
+              <a:ext uri="{FF2B5EF4-FFF2-40B4-BE49-F238E27FC236}">
+                <a16:creationId xmlns:a16="http://schemas.microsoft.com/office/drawing/2014/main" id="{0C1E1419-D755-4EE5-A721-4D53D835F5D1}"/>
+              </a:ext>
+            </a:extLst>
+          </p:cNvPr>
+          <p:cNvSpPr>
+            <a:spLocks noGrp="1"/>
+          </p:cNvSpPr>
+          <p:nvPr>
+            <p:ph type="ctrTitle"/>
+          </p:nvPr>
+        </p:nvSpPr>
+        <p:spPr/>
+        <p:txBody>
+          <a:bodyPr/>
+          <a:lstStyle/>
+          <a:p>
+            <a:r>
+              <a:rPr lang="en-US" b="1" dirty="0">
+                <a:latin typeface="+mn-lt"/>
+              </a:rPr>
+              <a:t>PATH 10b</a:t>
+            </a:r>
+          </a:p>
+        </p:txBody>
+      </p:sp>
+      <p:sp>
+        <p:nvSpPr>
+          <p:cNvPr id="3" name="Subtitle 2">
+            <a:extLst>
+              <a:ext uri="{FF2B5EF4-FFF2-40B4-BE49-F238E27FC236}">
+                <a16:creationId xmlns:a16="http://schemas.microsoft.com/office/drawing/2014/main" id="{B0AC6204-0C0A-4559-BC12-21BAB2CE2413}"/>
+              </a:ext>
+            </a:extLst>
+          </p:cNvPr>
+          <p:cNvSpPr>
+            <a:spLocks noGrp="1"/>
+          </p:cNvSpPr>
+          <p:nvPr>
+            <p:ph type="subTitle" idx="1"/>
+          </p:nvPr>
+        </p:nvSpPr>
+        <p:spPr/>
+        <p:txBody>
+          <a:bodyPr>
+            <a:normAutofit/>
+          </a:bodyPr>
+          <a:lstStyle/>
+          <a:p>
+            <a:r>
+              <a:rPr lang="en-US" sz="7200" dirty="0"/>
+              <a:t>4-2-4</a:t>
+            </a:r>
+          </a:p>
+        </p:txBody>
+      </p:sp>
+    </p:spTree>
+    <p:extLst>
+      <p:ext uri="{BB962C8B-B14F-4D97-AF65-F5344CB8AC3E}">
+        <p14:creationId xmlns:p14="http://schemas.microsoft.com/office/powerpoint/2010/main" val="381892296"/>
+      </p:ext>
+    </p:extLst>
+  </p:cSld>
+  <p:clrMapOvr>
+    <a:masterClrMapping/>
+  </p:clrMapOvr>
+</p:sld>
+</file>
+
+<file path=ppt/slides/slide42.xml><?xml version="1.0" encoding="utf-8"?>
+<p:sld xmlns:a="http://schemas.openxmlformats.org/drawingml/2006/main" xmlns:r="http://schemas.openxmlformats.org/officeDocument/2006/relationships" xmlns:p="http://schemas.openxmlformats.org/presentationml/2006/main">
+  <p:cSld>
+    <p:spTree>
+      <p:nvGrpSpPr>
+        <p:cNvPr id="1" name=""/>
+        <p:cNvGrpSpPr/>
+        <p:nvPr/>
+      </p:nvGrpSpPr>
+      <p:grpSpPr>
+        <a:xfrm>
+          <a:off x="0" y="0"/>
+          <a:ext cx="0" cy="0"/>
+          <a:chOff x="0" y="0"/>
+          <a:chExt cx="0" cy="0"/>
+        </a:xfrm>
+      </p:grpSpPr>
+      <p:sp>
+        <p:nvSpPr>
+          <p:cNvPr id="2" name="Title 1">
+            <a:extLst>
+              <a:ext uri="{FF2B5EF4-FFF2-40B4-BE49-F238E27FC236}">
+                <a16:creationId xmlns:a16="http://schemas.microsoft.com/office/drawing/2014/main" id="{0C1E1419-D755-4EE5-A721-4D53D835F5D1}"/>
+              </a:ext>
+            </a:extLst>
+          </p:cNvPr>
+          <p:cNvSpPr>
+            <a:spLocks noGrp="1"/>
+          </p:cNvSpPr>
+          <p:nvPr>
+            <p:ph type="ctrTitle"/>
+          </p:nvPr>
+        </p:nvSpPr>
+        <p:spPr/>
+        <p:txBody>
+          <a:bodyPr/>
+          <a:lstStyle/>
+          <a:p>
+            <a:r>
+              <a:rPr lang="en-US" b="1" dirty="0">
+                <a:latin typeface="+mn-lt"/>
+              </a:rPr>
+              <a:t>PATH 10c</a:t>
+            </a:r>
+          </a:p>
+        </p:txBody>
+      </p:sp>
+      <p:sp>
+        <p:nvSpPr>
+          <p:cNvPr id="3" name="Subtitle 2">
+            <a:extLst>
+              <a:ext uri="{FF2B5EF4-FFF2-40B4-BE49-F238E27FC236}">
+                <a16:creationId xmlns:a16="http://schemas.microsoft.com/office/drawing/2014/main" id="{B0AC6204-0C0A-4559-BC12-21BAB2CE2413}"/>
+              </a:ext>
+            </a:extLst>
+          </p:cNvPr>
+          <p:cNvSpPr>
+            <a:spLocks noGrp="1"/>
+          </p:cNvSpPr>
+          <p:nvPr>
+            <p:ph type="subTitle" idx="1"/>
+          </p:nvPr>
+        </p:nvSpPr>
+        <p:spPr/>
+        <p:txBody>
+          <a:bodyPr>
+            <a:normAutofit/>
+          </a:bodyPr>
+          <a:lstStyle/>
+          <a:p>
+            <a:r>
+              <a:rPr lang="en-US" sz="7200" dirty="0"/>
+              <a:t>4-2-4</a:t>
+            </a:r>
+          </a:p>
+        </p:txBody>
+      </p:sp>
+    </p:spTree>
+    <p:extLst>
+      <p:ext uri="{BB962C8B-B14F-4D97-AF65-F5344CB8AC3E}">
+        <p14:creationId xmlns:p14="http://schemas.microsoft.com/office/powerpoint/2010/main" val="3218831031"/>
+      </p:ext>
+    </p:extLst>
+  </p:cSld>
+  <p:clrMapOvr>
+    <a:masterClrMapping/>
+  </p:clrMapOvr>
+</p:sld>
+</file>
+
+<file path=ppt/slides/slide43.xml><?xml version="1.0" encoding="utf-8"?>
+<p:sld xmlns:a="http://schemas.openxmlformats.org/drawingml/2006/main" xmlns:r="http://schemas.openxmlformats.org/officeDocument/2006/relationships" xmlns:p="http://schemas.openxmlformats.org/presentationml/2006/main">
+  <p:cSld>
+    <p:spTree>
+      <p:nvGrpSpPr>
+        <p:cNvPr id="1" name=""/>
+        <p:cNvGrpSpPr/>
+        <p:nvPr/>
+      </p:nvGrpSpPr>
+      <p:grpSpPr>
+        <a:xfrm>
+          <a:off x="0" y="0"/>
+          <a:ext cx="0" cy="0"/>
+          <a:chOff x="0" y="0"/>
+          <a:chExt cx="0" cy="0"/>
+        </a:xfrm>
+      </p:grpSpPr>
+      <p:sp>
+        <p:nvSpPr>
+          <p:cNvPr id="2" name="Title 1">
+            <a:extLst>
+              <a:ext uri="{FF2B5EF4-FFF2-40B4-BE49-F238E27FC236}">
+                <a16:creationId xmlns:a16="http://schemas.microsoft.com/office/drawing/2014/main" id="{0C1E1419-D755-4EE5-A721-4D53D835F5D1}"/>
+              </a:ext>
+            </a:extLst>
+          </p:cNvPr>
+          <p:cNvSpPr>
+            <a:spLocks noGrp="1"/>
+          </p:cNvSpPr>
+          <p:nvPr>
+            <p:ph type="ctrTitle"/>
+          </p:nvPr>
+        </p:nvSpPr>
+        <p:spPr/>
+        <p:txBody>
+          <a:bodyPr/>
+          <a:lstStyle/>
+          <a:p>
+            <a:r>
+              <a:rPr lang="en-US" b="1" dirty="0">
+                <a:latin typeface="+mn-lt"/>
+              </a:rPr>
+              <a:t>PATH 10d</a:t>
+            </a:r>
+          </a:p>
+        </p:txBody>
+      </p:sp>
+      <p:sp>
+        <p:nvSpPr>
+          <p:cNvPr id="3" name="Subtitle 2">
+            <a:extLst>
+              <a:ext uri="{FF2B5EF4-FFF2-40B4-BE49-F238E27FC236}">
+                <a16:creationId xmlns:a16="http://schemas.microsoft.com/office/drawing/2014/main" id="{B0AC6204-0C0A-4559-BC12-21BAB2CE2413}"/>
+              </a:ext>
+            </a:extLst>
+          </p:cNvPr>
+          <p:cNvSpPr>
+            <a:spLocks noGrp="1"/>
+          </p:cNvSpPr>
+          <p:nvPr>
+            <p:ph type="subTitle" idx="1"/>
+          </p:nvPr>
+        </p:nvSpPr>
+        <p:spPr/>
+        <p:txBody>
+          <a:bodyPr>
+            <a:normAutofit/>
+          </a:bodyPr>
+          <a:lstStyle/>
+          <a:p>
+            <a:r>
+              <a:rPr lang="en-US" sz="7200" dirty="0"/>
+              <a:t>4-2-4</a:t>
+            </a:r>
+          </a:p>
+          <a:p>
+            <a:endParaRPr lang="en-US" sz="7200" dirty="0"/>
+          </a:p>
+        </p:txBody>
+      </p:sp>
+    </p:spTree>
+    <p:extLst>
+      <p:ext uri="{BB962C8B-B14F-4D97-AF65-F5344CB8AC3E}">
+        <p14:creationId xmlns:p14="http://schemas.microsoft.com/office/powerpoint/2010/main" val="3611236628"/>
+      </p:ext>
+    </p:extLst>
+  </p:cSld>
+  <p:clrMapOvr>
+    <a:masterClrMapping/>
+  </p:clrMapOvr>
+</p:sld>
+</file>
+
+<file path=ppt/slides/slide44.xml><?xml version="1.0" encoding="utf-8"?>
+<p:sld xmlns:a="http://schemas.openxmlformats.org/drawingml/2006/main" xmlns:r="http://schemas.openxmlformats.org/officeDocument/2006/relationships" xmlns:p="http://schemas.openxmlformats.org/presentationml/2006/main">
+  <p:cSld>
+    <p:spTree>
+      <p:nvGrpSpPr>
+        <p:cNvPr id="1" name=""/>
+        <p:cNvGrpSpPr/>
+        <p:nvPr/>
+      </p:nvGrpSpPr>
+      <p:grpSpPr>
+        <a:xfrm>
+          <a:off x="0" y="0"/>
+          <a:ext cx="0" cy="0"/>
+          <a:chOff x="0" y="0"/>
+          <a:chExt cx="0" cy="0"/>
+        </a:xfrm>
+      </p:grpSpPr>
+      <p:sp>
+        <p:nvSpPr>
+          <p:cNvPr id="2" name="Title 1">
+            <a:extLst>
+              <a:ext uri="{FF2B5EF4-FFF2-40B4-BE49-F238E27FC236}">
+                <a16:creationId xmlns:a16="http://schemas.microsoft.com/office/drawing/2014/main" id="{0C1E1419-D755-4EE5-A721-4D53D835F5D1}"/>
+              </a:ext>
+            </a:extLst>
+          </p:cNvPr>
+          <p:cNvSpPr>
+            <a:spLocks noGrp="1"/>
+          </p:cNvSpPr>
+          <p:nvPr>
+            <p:ph type="ctrTitle"/>
+          </p:nvPr>
+        </p:nvSpPr>
+        <p:spPr/>
+        <p:txBody>
+          <a:bodyPr/>
+          <a:lstStyle/>
+          <a:p>
+            <a:r>
+              <a:rPr lang="en-US" b="1" dirty="0">
+                <a:latin typeface="+mn-lt"/>
+              </a:rPr>
+              <a:t>PATH 11a</a:t>
+            </a:r>
+          </a:p>
+        </p:txBody>
+      </p:sp>
+      <p:sp>
+        <p:nvSpPr>
+          <p:cNvPr id="3" name="Subtitle 2">
+            <a:extLst>
+              <a:ext uri="{FF2B5EF4-FFF2-40B4-BE49-F238E27FC236}">
+                <a16:creationId xmlns:a16="http://schemas.microsoft.com/office/drawing/2014/main" id="{B0AC6204-0C0A-4559-BC12-21BAB2CE2413}"/>
+              </a:ext>
+            </a:extLst>
+          </p:cNvPr>
+          <p:cNvSpPr>
+            <a:spLocks noGrp="1"/>
+          </p:cNvSpPr>
+          <p:nvPr>
+            <p:ph type="subTitle" idx="1"/>
+          </p:nvPr>
+        </p:nvSpPr>
+        <p:spPr/>
+        <p:txBody>
+          <a:bodyPr>
+            <a:normAutofit/>
+          </a:bodyPr>
+          <a:lstStyle/>
+          <a:p>
+            <a:r>
+              <a:rPr lang="en-US" sz="7200" dirty="0"/>
+              <a:t>4-3-4</a:t>
+            </a:r>
+          </a:p>
+        </p:txBody>
+      </p:sp>
+    </p:spTree>
+    <p:extLst>
+      <p:ext uri="{BB962C8B-B14F-4D97-AF65-F5344CB8AC3E}">
+        <p14:creationId xmlns:p14="http://schemas.microsoft.com/office/powerpoint/2010/main" val="3594905468"/>
+      </p:ext>
+    </p:extLst>
+  </p:cSld>
+  <p:clrMapOvr>
+    <a:masterClrMapping/>
+  </p:clrMapOvr>
+</p:sld>
+</file>
+
+<file path=ppt/slides/slide45.xml><?xml version="1.0" encoding="utf-8"?>
+<p:sld xmlns:a="http://schemas.openxmlformats.org/drawingml/2006/main" xmlns:r="http://schemas.openxmlformats.org/officeDocument/2006/relationships" xmlns:p="http://schemas.openxmlformats.org/presentationml/2006/main">
+  <p:cSld>
+    <p:spTree>
+      <p:nvGrpSpPr>
+        <p:cNvPr id="1" name=""/>
+        <p:cNvGrpSpPr/>
+        <p:nvPr/>
+      </p:nvGrpSpPr>
+      <p:grpSpPr>
+        <a:xfrm>
+          <a:off x="0" y="0"/>
+          <a:ext cx="0" cy="0"/>
+          <a:chOff x="0" y="0"/>
+          <a:chExt cx="0" cy="0"/>
+        </a:xfrm>
+      </p:grpSpPr>
+      <p:sp>
+        <p:nvSpPr>
+          <p:cNvPr id="2" name="Title 1">
+            <a:extLst>
+              <a:ext uri="{FF2B5EF4-FFF2-40B4-BE49-F238E27FC236}">
+                <a16:creationId xmlns:a16="http://schemas.microsoft.com/office/drawing/2014/main" id="{0C1E1419-D755-4EE5-A721-4D53D835F5D1}"/>
+              </a:ext>
+            </a:extLst>
+          </p:cNvPr>
+          <p:cNvSpPr>
+            <a:spLocks noGrp="1"/>
+          </p:cNvSpPr>
+          <p:nvPr>
+            <p:ph type="ctrTitle"/>
+          </p:nvPr>
+        </p:nvSpPr>
+        <p:spPr/>
+        <p:txBody>
+          <a:bodyPr/>
+          <a:lstStyle/>
+          <a:p>
+            <a:r>
+              <a:rPr lang="en-US" b="1" dirty="0">
+                <a:latin typeface="+mn-lt"/>
+              </a:rPr>
+              <a:t>PATH 11b</a:t>
+            </a:r>
+          </a:p>
+        </p:txBody>
+      </p:sp>
+      <p:sp>
+        <p:nvSpPr>
+          <p:cNvPr id="3" name="Subtitle 2">
+            <a:extLst>
+              <a:ext uri="{FF2B5EF4-FFF2-40B4-BE49-F238E27FC236}">
+                <a16:creationId xmlns:a16="http://schemas.microsoft.com/office/drawing/2014/main" id="{B0AC6204-0C0A-4559-BC12-21BAB2CE2413}"/>
+              </a:ext>
+            </a:extLst>
+          </p:cNvPr>
+          <p:cNvSpPr>
+            <a:spLocks noGrp="1"/>
+          </p:cNvSpPr>
+          <p:nvPr>
+            <p:ph type="subTitle" idx="1"/>
+          </p:nvPr>
+        </p:nvSpPr>
+        <p:spPr/>
+        <p:txBody>
+          <a:bodyPr>
+            <a:normAutofit/>
+          </a:bodyPr>
+          <a:lstStyle/>
+          <a:p>
+            <a:r>
+              <a:rPr lang="en-US" sz="7200" dirty="0"/>
+              <a:t>4-3-4</a:t>
+            </a:r>
+          </a:p>
+          <a:p>
+            <a:endParaRPr lang="en-US" sz="7200" dirty="0"/>
+          </a:p>
+        </p:txBody>
+      </p:sp>
+    </p:spTree>
+    <p:extLst>
+      <p:ext uri="{BB962C8B-B14F-4D97-AF65-F5344CB8AC3E}">
+        <p14:creationId xmlns:p14="http://schemas.microsoft.com/office/powerpoint/2010/main" val="3720041446"/>
+      </p:ext>
+    </p:extLst>
+  </p:cSld>
+  <p:clrMapOvr>
+    <a:masterClrMapping/>
+  </p:clrMapOvr>
+</p:sld>
+</file>
+
+<file path=ppt/slides/slide46.xml><?xml version="1.0" encoding="utf-8"?>
+<p:sld xmlns:a="http://schemas.openxmlformats.org/drawingml/2006/main" xmlns:r="http://schemas.openxmlformats.org/officeDocument/2006/relationships" xmlns:p="http://schemas.openxmlformats.org/presentationml/2006/main">
+  <p:cSld>
+    <p:spTree>
+      <p:nvGrpSpPr>
+        <p:cNvPr id="1" name=""/>
+        <p:cNvGrpSpPr/>
+        <p:nvPr/>
+      </p:nvGrpSpPr>
+      <p:grpSpPr>
+        <a:xfrm>
+          <a:off x="0" y="0"/>
+          <a:ext cx="0" cy="0"/>
+          <a:chOff x="0" y="0"/>
+          <a:chExt cx="0" cy="0"/>
+        </a:xfrm>
+      </p:grpSpPr>
+      <p:sp>
+        <p:nvSpPr>
+          <p:cNvPr id="2" name="Title 1">
+            <a:extLst>
+              <a:ext uri="{FF2B5EF4-FFF2-40B4-BE49-F238E27FC236}">
+                <a16:creationId xmlns:a16="http://schemas.microsoft.com/office/drawing/2014/main" id="{0C1E1419-D755-4EE5-A721-4D53D835F5D1}"/>
+              </a:ext>
+            </a:extLst>
+          </p:cNvPr>
+          <p:cNvSpPr>
+            <a:spLocks noGrp="1"/>
+          </p:cNvSpPr>
+          <p:nvPr>
+            <p:ph type="ctrTitle"/>
+          </p:nvPr>
+        </p:nvSpPr>
+        <p:spPr/>
+        <p:txBody>
+          <a:bodyPr/>
+          <a:lstStyle/>
+          <a:p>
+            <a:r>
+              <a:rPr lang="en-US" b="1" dirty="0">
+                <a:latin typeface="+mn-lt"/>
+              </a:rPr>
+              <a:t>PATH 11c</a:t>
+            </a:r>
+          </a:p>
+        </p:txBody>
+      </p:sp>
+      <p:sp>
+        <p:nvSpPr>
+          <p:cNvPr id="3" name="Subtitle 2">
+            <a:extLst>
+              <a:ext uri="{FF2B5EF4-FFF2-40B4-BE49-F238E27FC236}">
+                <a16:creationId xmlns:a16="http://schemas.microsoft.com/office/drawing/2014/main" id="{B0AC6204-0C0A-4559-BC12-21BAB2CE2413}"/>
+              </a:ext>
+            </a:extLst>
+          </p:cNvPr>
+          <p:cNvSpPr>
+            <a:spLocks noGrp="1"/>
+          </p:cNvSpPr>
+          <p:nvPr>
+            <p:ph type="subTitle" idx="1"/>
+          </p:nvPr>
+        </p:nvSpPr>
+        <p:spPr/>
+        <p:txBody>
+          <a:bodyPr>
+            <a:normAutofit/>
+          </a:bodyPr>
+          <a:lstStyle/>
+          <a:p>
+            <a:r>
+              <a:rPr lang="en-US" sz="7200" dirty="0"/>
+              <a:t>4-3-4</a:t>
+            </a:r>
+          </a:p>
+        </p:txBody>
+      </p:sp>
+    </p:spTree>
+    <p:extLst>
+      <p:ext uri="{BB962C8B-B14F-4D97-AF65-F5344CB8AC3E}">
+        <p14:creationId xmlns:p14="http://schemas.microsoft.com/office/powerpoint/2010/main" val="1084440206"/>
+      </p:ext>
+    </p:extLst>
+  </p:cSld>
+  <p:clrMapOvr>
+    <a:masterClrMapping/>
+  </p:clrMapOvr>
+</p:sld>
+</file>
+
+<file path=ppt/slides/slide47.xml><?xml version="1.0" encoding="utf-8"?>
+<p:sld xmlns:a="http://schemas.openxmlformats.org/drawingml/2006/main" xmlns:r="http://schemas.openxmlformats.org/officeDocument/2006/relationships" xmlns:p="http://schemas.openxmlformats.org/presentationml/2006/main">
+  <p:cSld>
+    <p:spTree>
+      <p:nvGrpSpPr>
+        <p:cNvPr id="1" name=""/>
+        <p:cNvGrpSpPr/>
+        <p:nvPr/>
+      </p:nvGrpSpPr>
+      <p:grpSpPr>
+        <a:xfrm>
+          <a:off x="0" y="0"/>
+          <a:ext cx="0" cy="0"/>
+          <a:chOff x="0" y="0"/>
+          <a:chExt cx="0" cy="0"/>
+        </a:xfrm>
+      </p:grpSpPr>
+      <p:sp>
+        <p:nvSpPr>
+          <p:cNvPr id="2" name="Title 1">
+            <a:extLst>
+              <a:ext uri="{FF2B5EF4-FFF2-40B4-BE49-F238E27FC236}">
+                <a16:creationId xmlns:a16="http://schemas.microsoft.com/office/drawing/2014/main" id="{0C1E1419-D755-4EE5-A721-4D53D835F5D1}"/>
+              </a:ext>
+            </a:extLst>
+          </p:cNvPr>
+          <p:cNvSpPr>
+            <a:spLocks noGrp="1"/>
+          </p:cNvSpPr>
+          <p:nvPr>
+            <p:ph type="ctrTitle"/>
+          </p:nvPr>
+        </p:nvSpPr>
+        <p:spPr/>
+        <p:txBody>
+          <a:bodyPr/>
+          <a:lstStyle/>
+          <a:p>
+            <a:r>
+              <a:rPr lang="en-US" b="1" dirty="0">
+                <a:latin typeface="+mn-lt"/>
+              </a:rPr>
+              <a:t>PATH 11d</a:t>
+            </a:r>
+          </a:p>
+        </p:txBody>
+      </p:sp>
+      <p:sp>
+        <p:nvSpPr>
+          <p:cNvPr id="3" name="Subtitle 2">
+            <a:extLst>
+              <a:ext uri="{FF2B5EF4-FFF2-40B4-BE49-F238E27FC236}">
+                <a16:creationId xmlns:a16="http://schemas.microsoft.com/office/drawing/2014/main" id="{B0AC6204-0C0A-4559-BC12-21BAB2CE2413}"/>
+              </a:ext>
+            </a:extLst>
+          </p:cNvPr>
+          <p:cNvSpPr>
+            <a:spLocks noGrp="1"/>
+          </p:cNvSpPr>
+          <p:nvPr>
+            <p:ph type="subTitle" idx="1"/>
+          </p:nvPr>
+        </p:nvSpPr>
+        <p:spPr/>
+        <p:txBody>
+          <a:bodyPr>
+            <a:normAutofit/>
+          </a:bodyPr>
+          <a:lstStyle/>
+          <a:p>
+            <a:r>
+              <a:rPr lang="en-US" sz="7200" dirty="0"/>
+              <a:t>4-3-4</a:t>
+            </a:r>
+          </a:p>
+        </p:txBody>
+      </p:sp>
+    </p:spTree>
+    <p:extLst>
+      <p:ext uri="{BB962C8B-B14F-4D97-AF65-F5344CB8AC3E}">
+        <p14:creationId xmlns:p14="http://schemas.microsoft.com/office/powerpoint/2010/main" val="3155167368"/>
+      </p:ext>
+    </p:extLst>
+  </p:cSld>
+  <p:clrMapOvr>
+    <a:masterClrMapping/>
+  </p:clrMapOvr>
+</p:sld>
+</file>
+
+<file path=ppt/slides/slide48.xml><?xml version="1.0" encoding="utf-8"?>
+<p:sld xmlns:a="http://schemas.openxmlformats.org/drawingml/2006/main" xmlns:r="http://schemas.openxmlformats.org/officeDocument/2006/relationships" xmlns:p="http://schemas.openxmlformats.org/presentationml/2006/main">
+  <p:cSld>
+    <p:spTree>
+      <p:nvGrpSpPr>
+        <p:cNvPr id="1" name=""/>
+        <p:cNvGrpSpPr/>
+        <p:nvPr/>
+      </p:nvGrpSpPr>
+      <p:grpSpPr>
+        <a:xfrm>
+          <a:off x="0" y="0"/>
+          <a:ext cx="0" cy="0"/>
+          <a:chOff x="0" y="0"/>
+          <a:chExt cx="0" cy="0"/>
+        </a:xfrm>
+      </p:grpSpPr>
+      <p:sp>
+        <p:nvSpPr>
+          <p:cNvPr id="2" name="Title 1">
+            <a:extLst>
+              <a:ext uri="{FF2B5EF4-FFF2-40B4-BE49-F238E27FC236}">
+                <a16:creationId xmlns:a16="http://schemas.microsoft.com/office/drawing/2014/main" id="{0C1E1419-D755-4EE5-A721-4D53D835F5D1}"/>
+              </a:ext>
+            </a:extLst>
+          </p:cNvPr>
+          <p:cNvSpPr>
+            <a:spLocks noGrp="1"/>
+          </p:cNvSpPr>
+          <p:nvPr>
+            <p:ph type="ctrTitle"/>
+          </p:nvPr>
+        </p:nvSpPr>
+        <p:spPr/>
+        <p:txBody>
+          <a:bodyPr/>
+          <a:lstStyle/>
+          <a:p>
+            <a:r>
+              <a:rPr lang="en-US" b="1" dirty="0">
+                <a:latin typeface="+mn-lt"/>
+              </a:rPr>
+              <a:t>PATH 12a</a:t>
+            </a:r>
+          </a:p>
+        </p:txBody>
+      </p:sp>
+      <p:sp>
+        <p:nvSpPr>
+          <p:cNvPr id="3" name="Subtitle 2">
+            <a:extLst>
+              <a:ext uri="{FF2B5EF4-FFF2-40B4-BE49-F238E27FC236}">
+                <a16:creationId xmlns:a16="http://schemas.microsoft.com/office/drawing/2014/main" id="{B0AC6204-0C0A-4559-BC12-21BAB2CE2413}"/>
+              </a:ext>
+            </a:extLst>
+          </p:cNvPr>
+          <p:cNvSpPr>
+            <a:spLocks noGrp="1"/>
+          </p:cNvSpPr>
+          <p:nvPr>
+            <p:ph type="subTitle" idx="1"/>
+          </p:nvPr>
+        </p:nvSpPr>
+        <p:spPr/>
+        <p:txBody>
+          <a:bodyPr>
+            <a:normAutofit/>
+          </a:bodyPr>
+          <a:lstStyle/>
+          <a:p>
+            <a:r>
+              <a:rPr lang="en-US" sz="7200" dirty="0"/>
+              <a:t>4-1-4</a:t>
+            </a:r>
+          </a:p>
+        </p:txBody>
+      </p:sp>
+    </p:spTree>
+    <p:extLst>
+      <p:ext uri="{BB962C8B-B14F-4D97-AF65-F5344CB8AC3E}">
+        <p14:creationId xmlns:p14="http://schemas.microsoft.com/office/powerpoint/2010/main" val="53918502"/>
+      </p:ext>
+    </p:extLst>
+  </p:cSld>
+  <p:clrMapOvr>
+    <a:masterClrMapping/>
+  </p:clrMapOvr>
+</p:sld>
+</file>
+
+<file path=ppt/slides/slide49.xml><?xml version="1.0" encoding="utf-8"?>
+<p:sld xmlns:a="http://schemas.openxmlformats.org/drawingml/2006/main" xmlns:r="http://schemas.openxmlformats.org/officeDocument/2006/relationships" xmlns:p="http://schemas.openxmlformats.org/presentationml/2006/main">
+  <p:cSld>
+    <p:spTree>
+      <p:nvGrpSpPr>
+        <p:cNvPr id="1" name=""/>
+        <p:cNvGrpSpPr/>
+        <p:nvPr/>
+      </p:nvGrpSpPr>
+      <p:grpSpPr>
+        <a:xfrm>
+          <a:off x="0" y="0"/>
+          <a:ext cx="0" cy="0"/>
+          <a:chOff x="0" y="0"/>
+          <a:chExt cx="0" cy="0"/>
+        </a:xfrm>
+      </p:grpSpPr>
+      <p:sp>
+        <p:nvSpPr>
+          <p:cNvPr id="2" name="Title 1">
+            <a:extLst>
+              <a:ext uri="{FF2B5EF4-FFF2-40B4-BE49-F238E27FC236}">
+                <a16:creationId xmlns:a16="http://schemas.microsoft.com/office/drawing/2014/main" id="{0C1E1419-D755-4EE5-A721-4D53D835F5D1}"/>
+              </a:ext>
+            </a:extLst>
+          </p:cNvPr>
+          <p:cNvSpPr>
+            <a:spLocks noGrp="1"/>
+          </p:cNvSpPr>
+          <p:nvPr>
+            <p:ph type="ctrTitle"/>
+          </p:nvPr>
+        </p:nvSpPr>
+        <p:spPr/>
+        <p:txBody>
+          <a:bodyPr/>
+          <a:lstStyle/>
+          <a:p>
+            <a:r>
+              <a:rPr lang="en-US" b="1" dirty="0">
+                <a:latin typeface="+mn-lt"/>
+              </a:rPr>
+              <a:t>PATH 12b</a:t>
+            </a:r>
+          </a:p>
+        </p:txBody>
+      </p:sp>
+      <p:sp>
+        <p:nvSpPr>
+          <p:cNvPr id="3" name="Subtitle 2">
+            <a:extLst>
+              <a:ext uri="{FF2B5EF4-FFF2-40B4-BE49-F238E27FC236}">
+                <a16:creationId xmlns:a16="http://schemas.microsoft.com/office/drawing/2014/main" id="{B0AC6204-0C0A-4559-BC12-21BAB2CE2413}"/>
+              </a:ext>
+            </a:extLst>
+          </p:cNvPr>
+          <p:cNvSpPr>
+            <a:spLocks noGrp="1"/>
+          </p:cNvSpPr>
+          <p:nvPr>
+            <p:ph type="subTitle" idx="1"/>
+          </p:nvPr>
+        </p:nvSpPr>
+        <p:spPr/>
+        <p:txBody>
+          <a:bodyPr>
+            <a:normAutofit/>
+          </a:bodyPr>
+          <a:lstStyle/>
+          <a:p>
+            <a:r>
+              <a:rPr lang="en-US" sz="7200" dirty="0"/>
+              <a:t>4-1-4</a:t>
+            </a:r>
+          </a:p>
+        </p:txBody>
+      </p:sp>
+    </p:spTree>
+    <p:extLst>
+      <p:ext uri="{BB962C8B-B14F-4D97-AF65-F5344CB8AC3E}">
+        <p14:creationId xmlns:p14="http://schemas.microsoft.com/office/powerpoint/2010/main" val="4098990229"/>
+      </p:ext>
+    </p:extLst>
+  </p:cSld>
+  <p:clrMapOvr>
+    <a:masterClrMapping/>
+  </p:clrMapOvr>
+</p:sld>
+</file>
+
+<file path=ppt/slides/slide5.xml><?xml version="1.0" encoding="utf-8"?>
+<p:sld xmlns:a="http://schemas.openxmlformats.org/drawingml/2006/main" xmlns:r="http://schemas.openxmlformats.org/officeDocument/2006/relationships" xmlns:p="http://schemas.openxmlformats.org/presentationml/2006/main">
+  <p:cSld>
+    <p:spTree>
+      <p:nvGrpSpPr>
+        <p:cNvPr id="1" name=""/>
+        <p:cNvGrpSpPr/>
+        <p:nvPr/>
+      </p:nvGrpSpPr>
+      <p:grpSpPr>
+        <a:xfrm>
+          <a:off x="0" y="0"/>
+          <a:ext cx="0" cy="0"/>
+          <a:chOff x="0" y="0"/>
+          <a:chExt cx="0" cy="0"/>
+        </a:xfrm>
+      </p:grpSpPr>
+      <p:sp>
+        <p:nvSpPr>
+          <p:cNvPr id="2" name="Title 1">
+            <a:extLst>
+              <a:ext uri="{FF2B5EF4-FFF2-40B4-BE49-F238E27FC236}">
+                <a16:creationId xmlns:a16="http://schemas.microsoft.com/office/drawing/2014/main" id="{0C1E1419-D755-4EE5-A721-4D53D835F5D1}"/>
+              </a:ext>
+            </a:extLst>
+          </p:cNvPr>
+          <p:cNvSpPr>
+            <a:spLocks noGrp="1"/>
+          </p:cNvSpPr>
+          <p:nvPr>
+            <p:ph type="ctrTitle"/>
+          </p:nvPr>
+        </p:nvSpPr>
+        <p:spPr/>
+        <p:txBody>
+          <a:bodyPr/>
+          <a:lstStyle/>
+          <a:p>
+            <a:r>
+              <a:rPr lang="en-US" b="1" dirty="0">
+                <a:latin typeface="+mn-lt"/>
+              </a:rPr>
+              <a:t>PATH 2a</a:t>
+            </a:r>
+          </a:p>
+        </p:txBody>
+      </p:sp>
+      <p:sp>
+        <p:nvSpPr>
+          <p:cNvPr id="3" name="Subtitle 2">
+            <a:extLst>
+              <a:ext uri="{FF2B5EF4-FFF2-40B4-BE49-F238E27FC236}">
+                <a16:creationId xmlns:a16="http://schemas.microsoft.com/office/drawing/2014/main" id="{B0AC6204-0C0A-4559-BC12-21BAB2CE2413}"/>
+              </a:ext>
+            </a:extLst>
+          </p:cNvPr>
+          <p:cNvSpPr>
+            <a:spLocks noGrp="1"/>
+          </p:cNvSpPr>
+          <p:nvPr>
+            <p:ph type="subTitle" idx="1"/>
+          </p:nvPr>
+        </p:nvSpPr>
+        <p:spPr/>
+        <p:txBody>
+          <a:bodyPr>
+            <a:normAutofit/>
+          </a:bodyPr>
+          <a:lstStyle/>
+          <a:p>
+            <a:r>
+              <a:rPr lang="en-US" sz="7200" dirty="0"/>
+              <a:t>1-3-4</a:t>
+            </a:r>
+          </a:p>
+        </p:txBody>
+      </p:sp>
+    </p:spTree>
+    <p:extLst>
+      <p:ext uri="{BB962C8B-B14F-4D97-AF65-F5344CB8AC3E}">
+        <p14:creationId xmlns:p14="http://schemas.microsoft.com/office/powerpoint/2010/main" val="1327652223"/>
+      </p:ext>
+    </p:extLst>
+  </p:cSld>
+  <p:clrMapOvr>
+    <a:masterClrMapping/>
+  </p:clrMapOvr>
+</p:sld>
+</file>
+
+<file path=ppt/slides/slide50.xml><?xml version="1.0" encoding="utf-8"?>
+<p:sld xmlns:a="http://schemas.openxmlformats.org/drawingml/2006/main" xmlns:r="http://schemas.openxmlformats.org/officeDocument/2006/relationships" xmlns:p="http://schemas.openxmlformats.org/presentationml/2006/main">
+  <p:cSld>
+    <p:spTree>
+      <p:nvGrpSpPr>
+        <p:cNvPr id="1" name=""/>
+        <p:cNvGrpSpPr/>
+        <p:nvPr/>
+      </p:nvGrpSpPr>
+      <p:grpSpPr>
+        <a:xfrm>
+          <a:off x="0" y="0"/>
+          <a:ext cx="0" cy="0"/>
+          <a:chOff x="0" y="0"/>
+          <a:chExt cx="0" cy="0"/>
+        </a:xfrm>
+      </p:grpSpPr>
+      <p:sp>
+        <p:nvSpPr>
+          <p:cNvPr id="2" name="Title 1">
+            <a:extLst>
+              <a:ext uri="{FF2B5EF4-FFF2-40B4-BE49-F238E27FC236}">
+                <a16:creationId xmlns:a16="http://schemas.microsoft.com/office/drawing/2014/main" id="{0C1E1419-D755-4EE5-A721-4D53D835F5D1}"/>
+              </a:ext>
+            </a:extLst>
+          </p:cNvPr>
+          <p:cNvSpPr>
+            <a:spLocks noGrp="1"/>
+          </p:cNvSpPr>
+          <p:nvPr>
+            <p:ph type="ctrTitle"/>
+          </p:nvPr>
+        </p:nvSpPr>
+        <p:spPr/>
+        <p:txBody>
+          <a:bodyPr/>
+          <a:lstStyle/>
+          <a:p>
+            <a:r>
+              <a:rPr lang="en-US" b="1" dirty="0">
+                <a:latin typeface="+mn-lt"/>
+              </a:rPr>
+              <a:t>PATH 12c</a:t>
+            </a:r>
+          </a:p>
+        </p:txBody>
+      </p:sp>
+      <p:sp>
+        <p:nvSpPr>
+          <p:cNvPr id="3" name="Subtitle 2">
+            <a:extLst>
+              <a:ext uri="{FF2B5EF4-FFF2-40B4-BE49-F238E27FC236}">
+                <a16:creationId xmlns:a16="http://schemas.microsoft.com/office/drawing/2014/main" id="{B0AC6204-0C0A-4559-BC12-21BAB2CE2413}"/>
+              </a:ext>
+            </a:extLst>
+          </p:cNvPr>
+          <p:cNvSpPr>
+            <a:spLocks noGrp="1"/>
+          </p:cNvSpPr>
+          <p:nvPr>
+            <p:ph type="subTitle" idx="1"/>
+          </p:nvPr>
+        </p:nvSpPr>
+        <p:spPr/>
+        <p:txBody>
+          <a:bodyPr>
+            <a:normAutofit/>
+          </a:bodyPr>
+          <a:lstStyle/>
+          <a:p>
+            <a:r>
+              <a:rPr lang="en-US" sz="7200" dirty="0"/>
+              <a:t>4-1-4</a:t>
+            </a:r>
+          </a:p>
+          <a:p>
+            <a:endParaRPr lang="en-US" sz="7200" dirty="0"/>
+          </a:p>
+        </p:txBody>
+      </p:sp>
+    </p:spTree>
+    <p:extLst>
+      <p:ext uri="{BB962C8B-B14F-4D97-AF65-F5344CB8AC3E}">
+        <p14:creationId xmlns:p14="http://schemas.microsoft.com/office/powerpoint/2010/main" val="293487830"/>
+      </p:ext>
+    </p:extLst>
+  </p:cSld>
+  <p:clrMapOvr>
+    <a:masterClrMapping/>
+  </p:clrMapOvr>
+</p:sld>
+</file>
+
+<file path=ppt/slides/slide51.xml><?xml version="1.0" encoding="utf-8"?>
+<p:sld xmlns:a="http://schemas.openxmlformats.org/drawingml/2006/main" xmlns:r="http://schemas.openxmlformats.org/officeDocument/2006/relationships" xmlns:p="http://schemas.openxmlformats.org/presentationml/2006/main">
+  <p:cSld>
+    <p:spTree>
+      <p:nvGrpSpPr>
+        <p:cNvPr id="1" name=""/>
+        <p:cNvGrpSpPr/>
+        <p:nvPr/>
+      </p:nvGrpSpPr>
+      <p:grpSpPr>
+        <a:xfrm>
+          <a:off x="0" y="0"/>
+          <a:ext cx="0" cy="0"/>
+          <a:chOff x="0" y="0"/>
+          <a:chExt cx="0" cy="0"/>
+        </a:xfrm>
+      </p:grpSpPr>
+      <p:sp>
+        <p:nvSpPr>
+          <p:cNvPr id="2" name="Title 1">
+            <a:extLst>
+              <a:ext uri="{FF2B5EF4-FFF2-40B4-BE49-F238E27FC236}">
+                <a16:creationId xmlns:a16="http://schemas.microsoft.com/office/drawing/2014/main" id="{0C1E1419-D755-4EE5-A721-4D53D835F5D1}"/>
+              </a:ext>
+            </a:extLst>
+          </p:cNvPr>
+          <p:cNvSpPr>
+            <a:spLocks noGrp="1"/>
+          </p:cNvSpPr>
+          <p:nvPr>
+            <p:ph type="ctrTitle"/>
+          </p:nvPr>
+        </p:nvSpPr>
+        <p:spPr/>
+        <p:txBody>
+          <a:bodyPr/>
+          <a:lstStyle/>
+          <a:p>
+            <a:r>
+              <a:rPr lang="en-US" b="1" dirty="0">
+                <a:latin typeface="+mn-lt"/>
+              </a:rPr>
+              <a:t>PATH 12d</a:t>
+            </a:r>
+          </a:p>
+        </p:txBody>
+      </p:sp>
+      <p:sp>
+        <p:nvSpPr>
+          <p:cNvPr id="3" name="Subtitle 2">
+            <a:extLst>
+              <a:ext uri="{FF2B5EF4-FFF2-40B4-BE49-F238E27FC236}">
+                <a16:creationId xmlns:a16="http://schemas.microsoft.com/office/drawing/2014/main" id="{B0AC6204-0C0A-4559-BC12-21BAB2CE2413}"/>
+              </a:ext>
+            </a:extLst>
+          </p:cNvPr>
+          <p:cNvSpPr>
+            <a:spLocks noGrp="1"/>
+          </p:cNvSpPr>
+          <p:nvPr>
+            <p:ph type="subTitle" idx="1"/>
+          </p:nvPr>
+        </p:nvSpPr>
+        <p:spPr/>
+        <p:txBody>
+          <a:bodyPr>
+            <a:normAutofit/>
+          </a:bodyPr>
+          <a:lstStyle/>
+          <a:p>
+            <a:r>
+              <a:rPr lang="en-US" sz="7200" dirty="0"/>
+              <a:t>4-1-4</a:t>
+            </a:r>
+          </a:p>
+          <a:p>
+            <a:endParaRPr lang="en-US" sz="7200" dirty="0"/>
+          </a:p>
+        </p:txBody>
+      </p:sp>
+    </p:spTree>
+    <p:extLst>
+      <p:ext uri="{BB962C8B-B14F-4D97-AF65-F5344CB8AC3E}">
+        <p14:creationId xmlns:p14="http://schemas.microsoft.com/office/powerpoint/2010/main" val="2507823437"/>
+      </p:ext>
+    </p:extLst>
+  </p:cSld>
+  <p:clrMapOvr>
+    <a:masterClrMapping/>
+  </p:clrMapOvr>
+</p:sld>
+</file>
+
+<file path=ppt/slides/slide6.xml><?xml version="1.0" encoding="utf-8"?>
+<p:sld xmlns:a="http://schemas.openxmlformats.org/drawingml/2006/main" xmlns:r="http://schemas.openxmlformats.org/officeDocument/2006/relationships" xmlns:p="http://schemas.openxmlformats.org/presentationml/2006/main">
+  <p:cSld>
+    <p:spTree>
+      <p:nvGrpSpPr>
+        <p:cNvPr id="1" name=""/>
+        <p:cNvGrpSpPr/>
+        <p:nvPr/>
+      </p:nvGrpSpPr>
+      <p:grpSpPr>
+        <a:xfrm>
+          <a:off x="0" y="0"/>
+          <a:ext cx="0" cy="0"/>
+          <a:chOff x="0" y="0"/>
+          <a:chExt cx="0" cy="0"/>
+        </a:xfrm>
+      </p:grpSpPr>
+      <p:sp>
+        <p:nvSpPr>
+          <p:cNvPr id="2" name="Title 1">
+            <a:extLst>
+              <a:ext uri="{FF2B5EF4-FFF2-40B4-BE49-F238E27FC236}">
+                <a16:creationId xmlns:a16="http://schemas.microsoft.com/office/drawing/2014/main" id="{0C1E1419-D755-4EE5-A721-4D53D835F5D1}"/>
+              </a:ext>
+            </a:extLst>
+          </p:cNvPr>
+          <p:cNvSpPr>
+            <a:spLocks noGrp="1"/>
+          </p:cNvSpPr>
+          <p:nvPr>
+            <p:ph type="ctrTitle"/>
+          </p:nvPr>
+        </p:nvSpPr>
+        <p:spPr/>
+        <p:txBody>
+          <a:bodyPr/>
+          <a:lstStyle/>
+          <a:p>
+            <a:r>
+              <a:rPr lang="en-US" b="1" dirty="0">
+                <a:latin typeface="+mn-lt"/>
+              </a:rPr>
+              <a:t>PATH 2b</a:t>
+            </a:r>
+          </a:p>
+        </p:txBody>
+      </p:sp>
+      <p:sp>
+        <p:nvSpPr>
+          <p:cNvPr id="3" name="Subtitle 2">
+            <a:extLst>
+              <a:ext uri="{FF2B5EF4-FFF2-40B4-BE49-F238E27FC236}">
+                <a16:creationId xmlns:a16="http://schemas.microsoft.com/office/drawing/2014/main" id="{B0AC6204-0C0A-4559-BC12-21BAB2CE2413}"/>
+              </a:ext>
+            </a:extLst>
+          </p:cNvPr>
+          <p:cNvSpPr>
+            <a:spLocks noGrp="1"/>
+          </p:cNvSpPr>
+          <p:nvPr>
+            <p:ph type="subTitle" idx="1"/>
+          </p:nvPr>
+        </p:nvSpPr>
+        <p:spPr/>
+        <p:txBody>
+          <a:bodyPr>
+            <a:normAutofit/>
+          </a:bodyPr>
+          <a:lstStyle/>
+          <a:p>
+            <a:r>
+              <a:rPr lang="en-US" sz="7200" dirty="0"/>
+              <a:t>1-3-4</a:t>
+            </a:r>
+          </a:p>
+        </p:txBody>
+      </p:sp>
+    </p:spTree>
+    <p:extLst>
+      <p:ext uri="{BB962C8B-B14F-4D97-AF65-F5344CB8AC3E}">
+        <p14:creationId xmlns:p14="http://schemas.microsoft.com/office/powerpoint/2010/main" val="3824406416"/>
+      </p:ext>
+    </p:extLst>
+  </p:cSld>
+  <p:clrMapOvr>
+    <a:masterClrMapping/>
+  </p:clrMapOvr>
+</p:sld>
+</file>
+
+<file path=ppt/slides/slide7.xml><?xml version="1.0" encoding="utf-8"?>
+<p:sld xmlns:a="http://schemas.openxmlformats.org/drawingml/2006/main" xmlns:r="http://schemas.openxmlformats.org/officeDocument/2006/relationships" xmlns:p="http://schemas.openxmlformats.org/presentationml/2006/main">
+  <p:cSld>
+    <p:spTree>
+      <p:nvGrpSpPr>
+        <p:cNvPr id="1" name=""/>
+        <p:cNvGrpSpPr/>
+        <p:nvPr/>
+      </p:nvGrpSpPr>
+      <p:grpSpPr>
+        <a:xfrm>
+          <a:off x="0" y="0"/>
+          <a:ext cx="0" cy="0"/>
+          <a:chOff x="0" y="0"/>
+          <a:chExt cx="0" cy="0"/>
+        </a:xfrm>
+      </p:grpSpPr>
+      <p:sp>
+        <p:nvSpPr>
+          <p:cNvPr id="2" name="Title 1">
+            <a:extLst>
+              <a:ext uri="{FF2B5EF4-FFF2-40B4-BE49-F238E27FC236}">
+                <a16:creationId xmlns:a16="http://schemas.microsoft.com/office/drawing/2014/main" id="{0C1E1419-D755-4EE5-A721-4D53D835F5D1}"/>
+              </a:ext>
+            </a:extLst>
+          </p:cNvPr>
+          <p:cNvSpPr>
+            <a:spLocks noGrp="1"/>
+          </p:cNvSpPr>
+          <p:nvPr>
+            <p:ph type="ctrTitle"/>
+          </p:nvPr>
+        </p:nvSpPr>
+        <p:spPr/>
+        <p:txBody>
+          <a:bodyPr/>
+          <a:lstStyle/>
+          <a:p>
+            <a:r>
+              <a:rPr lang="en-US" b="1" dirty="0">
+                <a:latin typeface="+mn-lt"/>
+              </a:rPr>
+              <a:t>PATH 2c</a:t>
+            </a:r>
+          </a:p>
+        </p:txBody>
+      </p:sp>
+      <p:sp>
+        <p:nvSpPr>
+          <p:cNvPr id="3" name="Subtitle 2">
+            <a:extLst>
+              <a:ext uri="{FF2B5EF4-FFF2-40B4-BE49-F238E27FC236}">
+                <a16:creationId xmlns:a16="http://schemas.microsoft.com/office/drawing/2014/main" id="{B0AC6204-0C0A-4559-BC12-21BAB2CE2413}"/>
+              </a:ext>
+            </a:extLst>
+          </p:cNvPr>
+          <p:cNvSpPr>
+            <a:spLocks noGrp="1"/>
+          </p:cNvSpPr>
+          <p:nvPr>
+            <p:ph type="subTitle" idx="1"/>
+          </p:nvPr>
+        </p:nvSpPr>
+        <p:spPr/>
+        <p:txBody>
+          <a:bodyPr>
+            <a:normAutofit/>
+          </a:bodyPr>
+          <a:lstStyle/>
+          <a:p>
+            <a:r>
+              <a:rPr lang="en-US" sz="7200" dirty="0"/>
+              <a:t>1-3-4</a:t>
+            </a:r>
+          </a:p>
+        </p:txBody>
+      </p:sp>
+    </p:spTree>
+    <p:extLst>
+      <p:ext uri="{BB962C8B-B14F-4D97-AF65-F5344CB8AC3E}">
+        <p14:creationId xmlns:p14="http://schemas.microsoft.com/office/powerpoint/2010/main" val="3594526173"/>
+      </p:ext>
+    </p:extLst>
+  </p:cSld>
+  <p:clrMapOvr>
+    <a:masterClrMapping/>
+  </p:clrMapOvr>
+</p:sld>
+</file>
+
+<file path=ppt/slides/slide8.xml><?xml version="1.0" encoding="utf-8"?>
+<p:sld xmlns:a="http://schemas.openxmlformats.org/drawingml/2006/main" xmlns:r="http://schemas.openxmlformats.org/officeDocument/2006/relationships" xmlns:p="http://schemas.openxmlformats.org/presentationml/2006/main">
+  <p:cSld>
+    <p:spTree>
+      <p:nvGrpSpPr>
+        <p:cNvPr id="1" name=""/>
+        <p:cNvGrpSpPr/>
+        <p:nvPr/>
+      </p:nvGrpSpPr>
+      <p:grpSpPr>
+        <a:xfrm>
+          <a:off x="0" y="0"/>
+          <a:ext cx="0" cy="0"/>
+          <a:chOff x="0" y="0"/>
+          <a:chExt cx="0" cy="0"/>
+        </a:xfrm>
+      </p:grpSpPr>
+      <p:sp>
+        <p:nvSpPr>
+          <p:cNvPr id="2" name="Title 1">
+            <a:extLst>
+              <a:ext uri="{FF2B5EF4-FFF2-40B4-BE49-F238E27FC236}">
+                <a16:creationId xmlns:a16="http://schemas.microsoft.com/office/drawing/2014/main" id="{0C1E1419-D755-4EE5-A721-4D53D835F5D1}"/>
+              </a:ext>
+            </a:extLst>
+          </p:cNvPr>
+          <p:cNvSpPr>
+            <a:spLocks noGrp="1"/>
+          </p:cNvSpPr>
+          <p:nvPr>
+            <p:ph type="ctrTitle"/>
+          </p:nvPr>
+        </p:nvSpPr>
+        <p:spPr/>
+        <p:txBody>
+          <a:bodyPr/>
+          <a:lstStyle/>
+          <a:p>
+            <a:r>
+              <a:rPr lang="en-US" b="1" dirty="0">
+                <a:latin typeface="+mn-lt"/>
+              </a:rPr>
+              <a:t>PATH 2d</a:t>
+            </a:r>
+          </a:p>
+        </p:txBody>
+      </p:sp>
+      <p:sp>
+        <p:nvSpPr>
+          <p:cNvPr id="3" name="Subtitle 2">
+            <a:extLst>
+              <a:ext uri="{FF2B5EF4-FFF2-40B4-BE49-F238E27FC236}">
+                <a16:creationId xmlns:a16="http://schemas.microsoft.com/office/drawing/2014/main" id="{B0AC6204-0C0A-4559-BC12-21BAB2CE2413}"/>
+              </a:ext>
+            </a:extLst>
+          </p:cNvPr>
+          <p:cNvSpPr>
+            <a:spLocks noGrp="1"/>
+          </p:cNvSpPr>
+          <p:nvPr>
+            <p:ph type="subTitle" idx="1"/>
+          </p:nvPr>
+        </p:nvSpPr>
+        <p:spPr/>
+        <p:txBody>
+          <a:bodyPr>
+            <a:normAutofit/>
+          </a:bodyPr>
+          <a:lstStyle/>
+          <a:p>
+            <a:r>
+              <a:rPr lang="en-US" sz="7200" dirty="0"/>
+              <a:t>1-3-4</a:t>
+            </a:r>
+          </a:p>
+        </p:txBody>
+      </p:sp>
+    </p:spTree>
+    <p:extLst>
+      <p:ext uri="{BB962C8B-B14F-4D97-AF65-F5344CB8AC3E}">
+        <p14:creationId xmlns:p14="http://schemas.microsoft.com/office/powerpoint/2010/main" val="2083051775"/>
+      </p:ext>
+    </p:extLst>
+  </p:cSld>
+  <p:clrMapOvr>
+    <a:masterClrMapping/>
+  </p:clrMapOvr>
+</p:sld>
+</file>
+
+<file path=ppt/slides/slide9.xml><?xml version="1.0" encoding="utf-8"?>
+<p:sld xmlns:a="http://schemas.openxmlformats.org/drawingml/2006/main" xmlns:r="http://schemas.openxmlformats.org/officeDocument/2006/relationships" xmlns:p="http://schemas.openxmlformats.org/presentationml/2006/main">
+  <p:cSld>
+    <p:spTree>
+      <p:nvGrpSpPr>
+        <p:cNvPr id="1" name=""/>
+        <p:cNvGrpSpPr/>
+        <p:nvPr/>
+      </p:nvGrpSpPr>
+      <p:grpSpPr>
+        <a:xfrm>
+          <a:off x="0" y="0"/>
+          <a:ext cx="0" cy="0"/>
+          <a:chOff x="0" y="0"/>
+          <a:chExt cx="0" cy="0"/>
+        </a:xfrm>
+      </p:grpSpPr>
+      <p:sp>
+        <p:nvSpPr>
+          <p:cNvPr id="2" name="Title 1">
+            <a:extLst>
+              <a:ext uri="{FF2B5EF4-FFF2-40B4-BE49-F238E27FC236}">
+                <a16:creationId xmlns:a16="http://schemas.microsoft.com/office/drawing/2014/main" id="{0C1E1419-D755-4EE5-A721-4D53D835F5D1}"/>
+              </a:ext>
+            </a:extLst>
+          </p:cNvPr>
+          <p:cNvSpPr>
+            <a:spLocks noGrp="1"/>
+          </p:cNvSpPr>
+          <p:nvPr>
+            <p:ph type="ctrTitle"/>
+          </p:nvPr>
+        </p:nvSpPr>
+        <p:spPr/>
+        <p:txBody>
+          <a:bodyPr/>
+          <a:lstStyle/>
+          <a:p>
+            <a:r>
+              <a:rPr lang="en-US" b="1" dirty="0">
+                <a:latin typeface="+mn-lt"/>
+              </a:rPr>
+              <a:t>PATH 3a</a:t>
+            </a:r>
+          </a:p>
+        </p:txBody>
+      </p:sp>
+      <p:sp>
+        <p:nvSpPr>
+          <p:cNvPr id="3" name="Subtitle 2">
+            <a:extLst>
+              <a:ext uri="{FF2B5EF4-FFF2-40B4-BE49-F238E27FC236}">
+                <a16:creationId xmlns:a16="http://schemas.microsoft.com/office/drawing/2014/main" id="{B0AC6204-0C0A-4559-BC12-21BAB2CE2413}"/>
+              </a:ext>
+            </a:extLst>
+          </p:cNvPr>
+          <p:cNvSpPr>
+            <a:spLocks noGrp="1"/>
+          </p:cNvSpPr>
+          <p:nvPr>
+            <p:ph type="subTitle" idx="1"/>
+          </p:nvPr>
+        </p:nvSpPr>
+        <p:spPr/>
+        <p:txBody>
+          <a:bodyPr>
+            <a:normAutofit/>
+          </a:bodyPr>
+          <a:lstStyle/>
+          <a:p>
+            <a:r>
+              <a:rPr lang="en-US" sz="7200" dirty="0"/>
+              <a:t>1-1-4</a:t>
+            </a:r>
+          </a:p>
+        </p:txBody>
+      </p:sp>
+    </p:spTree>
+    <p:extLst>
+      <p:ext uri="{BB962C8B-B14F-4D97-AF65-F5344CB8AC3E}">
+        <p14:creationId xmlns:p14="http://schemas.microsoft.com/office/powerpoint/2010/main" val="2703683117"/>
       </p:ext>
     </p:extLst>
   </p:cSld>

</xml_diff>